<commit_message>
added exercises 3 and 4
</commit_message>
<xml_diff>
--- a/exercise 2/exercise 2.pptx
+++ b/exercise 2/exercise 2.pptx
@@ -222,7 +222,7 @@
           </a:lstStyle>
           <a:p>
             <a:fld id="{EE9FF0A6-F043-274C-AF55-AE0A85C53A91}" type="datetimeFigureOut">
-              <a:t>1/14/16</a:t>
+              <a:t>1/18/16</a:t>
             </a:fld>
             <a:endParaRPr lang="en-US"/>
           </a:p>
@@ -835,7 +835,7 @@
           <a:p>
             <a:fld id="{6767C622-365D-4549-80DD-6A61E2992874}" type="datetimeFigureOut">
               <a:rPr lang="en-US" smtClean="0"/>
-              <a:t>1/13/16</a:t>
+              <a:t>1/18/16</a:t>
             </a:fld>
             <a:endParaRPr lang="en-US"/>
           </a:p>
@@ -1005,7 +1005,7 @@
           <a:p>
             <a:fld id="{6767C622-365D-4549-80DD-6A61E2992874}" type="datetimeFigureOut">
               <a:rPr lang="en-US" smtClean="0"/>
-              <a:t>1/13/16</a:t>
+              <a:t>1/18/16</a:t>
             </a:fld>
             <a:endParaRPr lang="en-US"/>
           </a:p>
@@ -1185,7 +1185,7 @@
           <a:p>
             <a:fld id="{6767C622-365D-4549-80DD-6A61E2992874}" type="datetimeFigureOut">
               <a:rPr lang="en-US" smtClean="0"/>
-              <a:t>1/13/16</a:t>
+              <a:t>1/18/16</a:t>
             </a:fld>
             <a:endParaRPr lang="en-US"/>
           </a:p>
@@ -1355,7 +1355,7 @@
           <a:p>
             <a:fld id="{6767C622-365D-4549-80DD-6A61E2992874}" type="datetimeFigureOut">
               <a:rPr lang="en-US" smtClean="0"/>
-              <a:t>1/13/16</a:t>
+              <a:t>1/18/16</a:t>
             </a:fld>
             <a:endParaRPr lang="en-US"/>
           </a:p>
@@ -1601,7 +1601,7 @@
           <a:p>
             <a:fld id="{6767C622-365D-4549-80DD-6A61E2992874}" type="datetimeFigureOut">
               <a:rPr lang="en-US" smtClean="0"/>
-              <a:t>1/13/16</a:t>
+              <a:t>1/18/16</a:t>
             </a:fld>
             <a:endParaRPr lang="en-US"/>
           </a:p>
@@ -1889,7 +1889,7 @@
           <a:p>
             <a:fld id="{6767C622-365D-4549-80DD-6A61E2992874}" type="datetimeFigureOut">
               <a:rPr lang="en-US" smtClean="0"/>
-              <a:t>1/13/16</a:t>
+              <a:t>1/18/16</a:t>
             </a:fld>
             <a:endParaRPr lang="en-US"/>
           </a:p>
@@ -2311,7 +2311,7 @@
           <a:p>
             <a:fld id="{6767C622-365D-4549-80DD-6A61E2992874}" type="datetimeFigureOut">
               <a:rPr lang="en-US" smtClean="0"/>
-              <a:t>1/13/16</a:t>
+              <a:t>1/18/16</a:t>
             </a:fld>
             <a:endParaRPr lang="en-US"/>
           </a:p>
@@ -2429,7 +2429,7 @@
           <a:p>
             <a:fld id="{6767C622-365D-4549-80DD-6A61E2992874}" type="datetimeFigureOut">
               <a:rPr lang="en-US" smtClean="0"/>
-              <a:t>1/13/16</a:t>
+              <a:t>1/18/16</a:t>
             </a:fld>
             <a:endParaRPr lang="en-US"/>
           </a:p>
@@ -2524,7 +2524,7 @@
           <a:p>
             <a:fld id="{6767C622-365D-4549-80DD-6A61E2992874}" type="datetimeFigureOut">
               <a:rPr lang="en-US" smtClean="0"/>
-              <a:t>1/13/16</a:t>
+              <a:t>1/18/16</a:t>
             </a:fld>
             <a:endParaRPr lang="en-US"/>
           </a:p>
@@ -2801,7 +2801,7 @@
           <a:p>
             <a:fld id="{6767C622-365D-4549-80DD-6A61E2992874}" type="datetimeFigureOut">
               <a:rPr lang="en-US" smtClean="0"/>
-              <a:t>1/13/16</a:t>
+              <a:t>1/18/16</a:t>
             </a:fld>
             <a:endParaRPr lang="en-US"/>
           </a:p>
@@ -3057,7 +3057,7 @@
           <a:p>
             <a:fld id="{6767C622-365D-4549-80DD-6A61E2992874}" type="datetimeFigureOut">
               <a:rPr lang="en-US" smtClean="0"/>
-              <a:t>1/13/16</a:t>
+              <a:t>1/18/16</a:t>
             </a:fld>
             <a:endParaRPr lang="en-US"/>
           </a:p>
@@ -3270,7 +3270,7 @@
           <a:p>
             <a:fld id="{6767C622-365D-4549-80DD-6A61E2992874}" type="datetimeFigureOut">
               <a:rPr lang="en-US" smtClean="0"/>
-              <a:t>1/13/16</a:t>
+              <a:t>1/18/16</a:t>
             </a:fld>
             <a:endParaRPr lang="en-US"/>
           </a:p>
@@ -3782,7 +3782,7 @@
                 <a:latin typeface="Helvetica"/>
                 <a:cs typeface="Helvetica"/>
               </a:rPr>
-              <a:t>Import data from Excel and CSV</a:t>
+              <a:t>Import Experimental Data (Excel, CSV)</a:t>
             </a:r>
           </a:p>
           <a:p>
@@ -3839,6 +3839,13 @@
   <p:clrMapOvr>
     <a:masterClrMapping/>
   </p:clrMapOvr>
+  <p:timing>
+    <p:tnLst>
+      <p:par>
+        <p:cTn xmlns:p14="http://schemas.microsoft.com/office/powerpoint/2010/main" id="1" dur="indefinite" restart="never" nodeType="tmRoot"/>
+      </p:par>
+    </p:tnLst>
+  </p:timing>
 </p:sld>
 </file>
 
@@ -3903,7 +3910,7 @@
         <p:spPr>
           <a:xfrm>
             <a:off x="313429" y="671170"/>
-            <a:ext cx="8602385" cy="5909311"/>
+            <a:ext cx="8602385" cy="5632312"/>
           </a:xfrm>
           <a:prstGeom prst="rect">
             <a:avLst/>
@@ -3954,15 +3961,6 @@
                 <a:latin typeface="Courier New"/>
                 <a:cs typeface="Courier New"/>
               </a:rPr>
-              <a:t>one_over_time = 1.0/time</a:t>
-            </a:r>
-          </a:p>
-          <a:p>
-            <a:r>
-              <a:rPr lang="en-US" dirty="0">
-                <a:latin typeface="Courier New"/>
-                <a:cs typeface="Courier New"/>
-              </a:rPr>
               <a:t>one_over_absorbance = 1.0/absorbance</a:t>
             </a:r>
           </a:p>
@@ -4014,7 +4012,7 @@
                 <a:latin typeface="Courier New"/>
                 <a:cs typeface="Courier New"/>
               </a:rPr>
-              <a:t>plt.plot(one_over_time[:30],one_over_absorbance[:30],"b.")</a:t>
+              <a:t>plt.plot(time[:30],one_over_absorbance[:30],"b.")</a:t>
             </a:r>
           </a:p>
           <a:p>
@@ -4104,6 +4102,13 @@
   <p:clrMapOvr>
     <a:masterClrMapping/>
   </p:clrMapOvr>
+  <p:timing>
+    <p:tnLst>
+      <p:par>
+        <p:cTn xmlns:p14="http://schemas.microsoft.com/office/powerpoint/2010/main" id="1" dur="indefinite" restart="never" nodeType="tmRoot"/>
+      </p:par>
+    </p:tnLst>
+  </p:timing>
 </p:sld>
 </file>
 
@@ -4421,87 +4426,6 @@
           </a:prstGeom>
         </p:spPr>
       </p:pic>
-      <p:pic>
-        <p:nvPicPr>
-          <p:cNvPr id="6" name="Picture 5"/>
-          <p:cNvPicPr>
-            <a:picLocks noChangeAspect="1"/>
-          </p:cNvPicPr>
-          <p:nvPr/>
-        </p:nvPicPr>
-        <p:blipFill>
-          <a:blip r:embed="rId5"/>
-          <a:stretch>
-            <a:fillRect/>
-          </a:stretch>
-        </p:blipFill>
-        <p:spPr>
-          <a:xfrm>
-            <a:off x="6203628" y="1115452"/>
-            <a:ext cx="2834548" cy="1940634"/>
-          </a:xfrm>
-          <a:prstGeom prst="rect">
-            <a:avLst/>
-          </a:prstGeom>
-        </p:spPr>
-      </p:pic>
-      <p:graphicFrame>
-        <p:nvGraphicFramePr>
-          <p:cNvPr id="7" name="Object 6"/>
-          <p:cNvGraphicFramePr>
-            <a:graphicFrameLocks noChangeAspect="1"/>
-          </p:cNvGraphicFramePr>
-          <p:nvPr>
-            <p:extLst>
-              <p:ext uri="{D42A27DB-BD31-4B8C-83A1-F6EECF244321}">
-                <p14:modId xmlns:p14="http://schemas.microsoft.com/office/powerpoint/2010/main" val="4081160025"/>
-              </p:ext>
-            </p:extLst>
-          </p:nvPr>
-        </p:nvGraphicFramePr>
-        <p:xfrm>
-          <a:off x="3263453" y="4141838"/>
-          <a:ext cx="2588557" cy="527764"/>
-        </p:xfrm>
-        <a:graphic>
-          <a:graphicData uri="http://schemas.openxmlformats.org/presentationml/2006/ole">
-            <mc:AlternateContent xmlns:mc="http://schemas.openxmlformats.org/markup-compatibility/2006">
-              <mc:Choice xmlns:v="urn:schemas-microsoft-com:vml" Requires="v">
-                <p:oleObj spid="_x0000_s1033" name="Equation" r:id="rId6" imgW="1308100" imgH="266700" progId="Equation.DSMT4">
-                  <p:embed/>
-                </p:oleObj>
-              </mc:Choice>
-              <mc:Fallback>
-                <p:oleObj name="Equation" r:id="rId6" imgW="1308100" imgH="266700" progId="Equation.DSMT4">
-                  <p:embed/>
-                  <p:pic>
-                    <p:nvPicPr>
-                      <p:cNvPr id="0" name=""/>
-                      <p:cNvPicPr/>
-                      <p:nvPr/>
-                    </p:nvPicPr>
-                    <p:blipFill>
-                      <a:blip r:embed="rId7"/>
-                      <a:stretch>
-                        <a:fillRect/>
-                      </a:stretch>
-                    </p:blipFill>
-                    <p:spPr>
-                      <a:xfrm>
-                        <a:off x="3263453" y="4141838"/>
-                        <a:ext cx="2588557" cy="527764"/>
-                      </a:xfrm>
-                      <a:prstGeom prst="rect">
-                        <a:avLst/>
-                      </a:prstGeom>
-                    </p:spPr>
-                  </p:pic>
-                </p:oleObj>
-              </mc:Fallback>
-            </mc:AlternateContent>
-          </a:graphicData>
-        </a:graphic>
-      </p:graphicFrame>
       <p:graphicFrame>
         <p:nvGraphicFramePr>
           <p:cNvPr id="8" name="Object 7"/>
@@ -4524,12 +4448,197 @@
           <a:graphicData uri="http://schemas.openxmlformats.org/presentationml/2006/ole">
             <mc:AlternateContent xmlns:mc="http://schemas.openxmlformats.org/markup-compatibility/2006">
               <mc:Choice xmlns:v="urn:schemas-microsoft-com:vml" Requires="v">
-                <p:oleObj spid="_x0000_s1034" name="Equation" r:id="rId8" imgW="1587500" imgH="203200" progId="Equation.DSMT4">
+                <p:oleObj spid="_x0000_s1049" name="Equation" r:id="rId5" imgW="1587500" imgH="203200" progId="Equation.DSMT4">
                   <p:embed/>
                 </p:oleObj>
               </mc:Choice>
               <mc:Fallback>
-                <p:oleObj name="Equation" r:id="rId8" imgW="1587500" imgH="203200" progId="Equation.DSMT4">
+                <p:oleObj name="Equation" r:id="rId5" imgW="1587500" imgH="203200" progId="Equation.DSMT4">
+                  <p:embed/>
+                  <p:pic>
+                    <p:nvPicPr>
+                      <p:cNvPr id="0" name=""/>
+                      <p:cNvPicPr/>
+                      <p:nvPr/>
+                    </p:nvPicPr>
+                    <p:blipFill>
+                      <a:blip r:embed="rId6"/>
+                      <a:stretch>
+                        <a:fillRect/>
+                      </a:stretch>
+                    </p:blipFill>
+                    <p:spPr>
+                      <a:xfrm>
+                        <a:off x="2733220" y="5346080"/>
+                        <a:ext cx="3668391" cy="469554"/>
+                      </a:xfrm>
+                      <a:prstGeom prst="rect">
+                        <a:avLst/>
+                      </a:prstGeom>
+                    </p:spPr>
+                  </p:pic>
+                </p:oleObj>
+              </mc:Fallback>
+            </mc:AlternateContent>
+          </a:graphicData>
+        </a:graphic>
+      </p:graphicFrame>
+      <p:pic>
+        <p:nvPicPr>
+          <p:cNvPr id="9" name="Picture 8"/>
+          <p:cNvPicPr>
+            <a:picLocks noChangeAspect="1"/>
+          </p:cNvPicPr>
+          <p:nvPr/>
+        </p:nvPicPr>
+        <p:blipFill>
+          <a:blip r:embed="rId7"/>
+          <a:stretch>
+            <a:fillRect/>
+          </a:stretch>
+        </p:blipFill>
+        <p:spPr>
+          <a:xfrm>
+            <a:off x="6170614" y="1101950"/>
+            <a:ext cx="2861828" cy="1969430"/>
+          </a:xfrm>
+          <a:prstGeom prst="rect">
+            <a:avLst/>
+          </a:prstGeom>
+        </p:spPr>
+      </p:pic>
+      <p:sp>
+        <p:nvSpPr>
+          <p:cNvPr id="10" name="TextBox 9"/>
+          <p:cNvSpPr txBox="1"/>
+          <p:nvPr/>
+        </p:nvSpPr>
+        <p:spPr>
+          <a:xfrm>
+            <a:off x="1575542" y="1254519"/>
+            <a:ext cx="3232542" cy="369332"/>
+          </a:xfrm>
+          <a:prstGeom prst="rect">
+            <a:avLst/>
+          </a:prstGeom>
+          <a:noFill/>
+        </p:spPr>
+        <p:txBody>
+          <a:bodyPr wrap="square" rtlCol="0">
+            <a:spAutoFit/>
+          </a:bodyPr>
+          <a:lstStyle/>
+          <a:p>
+            <a:r>
+              <a:rPr lang="en-US" dirty="0">
+                <a:latin typeface="Helvetica"/>
+                <a:cs typeface="Helvetica"/>
+              </a:rPr>
+              <a:t>[A] vs. time</a:t>
+            </a:r>
+            <a:endParaRPr lang="en-US" dirty="0">
+              <a:latin typeface="Helvetica"/>
+              <a:cs typeface="Helvetica"/>
+            </a:endParaRPr>
+          </a:p>
+        </p:txBody>
+      </p:sp>
+      <p:sp>
+        <p:nvSpPr>
+          <p:cNvPr id="11" name="TextBox 10"/>
+          <p:cNvSpPr txBox="1"/>
+          <p:nvPr/>
+        </p:nvSpPr>
+        <p:spPr>
+          <a:xfrm>
+            <a:off x="4355430" y="1254519"/>
+            <a:ext cx="3232542" cy="369332"/>
+          </a:xfrm>
+          <a:prstGeom prst="rect">
+            <a:avLst/>
+          </a:prstGeom>
+          <a:noFill/>
+        </p:spPr>
+        <p:txBody>
+          <a:bodyPr wrap="square" rtlCol="0">
+            <a:spAutoFit/>
+          </a:bodyPr>
+          <a:lstStyle/>
+          <a:p>
+            <a:r>
+              <a:rPr lang="en-US" dirty="0">
+                <a:latin typeface="Helvetica"/>
+                <a:cs typeface="Helvetica"/>
+              </a:rPr>
+              <a:t>ln [A] vs. time</a:t>
+            </a:r>
+          </a:p>
+        </p:txBody>
+      </p:sp>
+      <p:sp>
+        <p:nvSpPr>
+          <p:cNvPr id="12" name="TextBox 11"/>
+          <p:cNvSpPr txBox="1"/>
+          <p:nvPr/>
+        </p:nvSpPr>
+        <p:spPr>
+          <a:xfrm>
+            <a:off x="7430256" y="2462584"/>
+            <a:ext cx="1612395" cy="369332"/>
+          </a:xfrm>
+          <a:prstGeom prst="rect">
+            <a:avLst/>
+          </a:prstGeom>
+          <a:noFill/>
+        </p:spPr>
+        <p:txBody>
+          <a:bodyPr wrap="square" rtlCol="0">
+            <a:spAutoFit/>
+          </a:bodyPr>
+          <a:lstStyle/>
+          <a:p>
+            <a:r>
+              <a:rPr lang="en-US" dirty="0">
+                <a:latin typeface="Helvetica"/>
+                <a:cs typeface="Helvetica"/>
+              </a:rPr>
+              <a:t>1/[A] vs. time</a:t>
+            </a:r>
+            <a:endParaRPr lang="en-US" dirty="0">
+              <a:latin typeface="Helvetica"/>
+              <a:cs typeface="Helvetica"/>
+            </a:endParaRPr>
+          </a:p>
+        </p:txBody>
+      </p:sp>
+      <p:graphicFrame>
+        <p:nvGraphicFramePr>
+          <p:cNvPr id="13" name="Object 12"/>
+          <p:cNvGraphicFramePr>
+            <a:graphicFrameLocks noChangeAspect="1"/>
+          </p:cNvGraphicFramePr>
+          <p:nvPr>
+            <p:extLst>
+              <p:ext uri="{D42A27DB-BD31-4B8C-83A1-F6EECF244321}">
+                <p14:modId xmlns:p14="http://schemas.microsoft.com/office/powerpoint/2010/main" val="1140915023"/>
+              </p:ext>
+            </p:extLst>
+          </p:nvPr>
+        </p:nvGraphicFramePr>
+        <p:xfrm>
+          <a:off x="2956577" y="4106522"/>
+          <a:ext cx="3395964" cy="575123"/>
+        </p:xfrm>
+        <a:graphic>
+          <a:graphicData uri="http://schemas.openxmlformats.org/presentationml/2006/ole">
+            <mc:AlternateContent xmlns:mc="http://schemas.openxmlformats.org/markup-compatibility/2006">
+              <mc:Choice xmlns:v="urn:schemas-microsoft-com:vml" Requires="v">
+                <p:oleObj spid="_x0000_s1050" name="Equation" r:id="rId8" imgW="1574800" imgH="266700" progId="Equation.DSMT4">
+                  <p:embed/>
+                </p:oleObj>
+              </mc:Choice>
+              <mc:Fallback>
+                <p:oleObj name="Equation" r:id="rId8" imgW="1574800" imgH="266700" progId="Equation.DSMT4">
                   <p:embed/>
                   <p:pic>
                     <p:nvPicPr>
@@ -4545,8 +4654,8 @@
                     </p:blipFill>
                     <p:spPr>
                       <a:xfrm>
-                        <a:off x="2733220" y="5346080"/>
-                        <a:ext cx="3668391" cy="469554"/>
+                        <a:off x="2956577" y="4106522"/>
+                        <a:ext cx="3395964" cy="575123"/>
                       </a:xfrm>
                       <a:prstGeom prst="rect">
                         <a:avLst/>
@@ -4569,6 +4678,13 @@
   <p:clrMapOvr>
     <a:masterClrMapping/>
   </p:clrMapOvr>
+  <p:timing>
+    <p:tnLst>
+      <p:par>
+        <p:cTn xmlns:p14="http://schemas.microsoft.com/office/powerpoint/2010/main" id="1" dur="indefinite" restart="never" nodeType="tmRoot"/>
+      </p:par>
+    </p:tnLst>
+  </p:timing>
 </p:sld>
 </file>
 
@@ -4633,7 +4749,7 @@
         <p:spPr>
           <a:xfrm>
             <a:off x="313429" y="671170"/>
-            <a:ext cx="8602385" cy="4801315"/>
+            <a:ext cx="8602385" cy="6186310"/>
           </a:xfrm>
           <a:prstGeom prst="rect">
             <a:avLst/>
@@ -4665,7 +4781,7 @@
                 <a:latin typeface="Helvetica"/>
                 <a:cs typeface="Helvetica"/>
               </a:rPr>
-              <a:t>.  (This could also account for any background absorbance, like that of the container.)</a:t>
+              <a:t>.  (This could also account for any constant background absorbance, like that of the container.)</a:t>
             </a:r>
           </a:p>
           <a:p>
@@ -4720,6 +4836,30 @@
             </a:endParaRPr>
           </a:p>
           <a:p>
+            <a:endParaRPr lang="en-US" dirty="0">
+              <a:latin typeface="Helvetica"/>
+              <a:cs typeface="Helvetica"/>
+            </a:endParaRPr>
+          </a:p>
+          <a:p>
+            <a:endParaRPr lang="en-US" dirty="0">
+              <a:latin typeface="Helvetica"/>
+              <a:cs typeface="Helvetica"/>
+            </a:endParaRPr>
+          </a:p>
+          <a:p>
+            <a:endParaRPr lang="en-US" dirty="0">
+              <a:latin typeface="Helvetica"/>
+              <a:cs typeface="Helvetica"/>
+            </a:endParaRPr>
+          </a:p>
+          <a:p>
+            <a:endParaRPr lang="en-US" dirty="0">
+              <a:latin typeface="Helvetica"/>
+              <a:cs typeface="Helvetica"/>
+            </a:endParaRPr>
+          </a:p>
+          <a:p>
             <a:r>
               <a:rPr lang="en-US" dirty="0">
                 <a:latin typeface="Helvetica"/>
@@ -4746,7 +4886,7 @@
                 <a:latin typeface="Helvetica"/>
                 <a:cs typeface="Helvetica"/>
               </a:rPr>
-              <a:t> represents the infinity value, </a:t>
+              <a:t> represents the absorbance at infinite time, </a:t>
             </a:r>
             <a:r>
               <a:rPr lang="en-US" i="1" dirty="0">
@@ -4767,7 +4907,35 @@
                 <a:latin typeface="Helvetica"/>
                 <a:cs typeface="Helvetica"/>
               </a:rPr>
-              <a:t> is ε’, and </a:t>
+              <a:t> is </a:t>
+            </a:r>
+            <a:r>
+              <a:rPr lang="en-US" i="1" dirty="0">
+                <a:latin typeface="Helvetica"/>
+                <a:cs typeface="Helvetica"/>
+              </a:rPr>
+              <a:t>ε</a:t>
+            </a:r>
+            <a:r>
+              <a:rPr lang="en-US" dirty="0">
+                <a:latin typeface="Helvetica"/>
+                <a:cs typeface="Helvetica"/>
+              </a:rPr>
+              <a:t>’[A]</a:t>
+            </a:r>
+            <a:r>
+              <a:rPr lang="en-US" baseline="-25000" dirty="0">
+                <a:latin typeface="Helvetica"/>
+                <a:cs typeface="Helvetica"/>
+              </a:rPr>
+              <a:t>0</a:t>
+            </a:r>
+            <a:r>
+              <a:rPr lang="en-US" dirty="0">
+                <a:latin typeface="Helvetica"/>
+                <a:cs typeface="Helvetica"/>
+              </a:rPr>
+              <a:t>, and </a:t>
             </a:r>
             <a:r>
               <a:rPr lang="en-US" i="1" dirty="0">
@@ -4846,32 +5014,32 @@
       </p:sp>
       <p:graphicFrame>
         <p:nvGraphicFramePr>
-          <p:cNvPr id="10" name="Object 9"/>
+          <p:cNvPr id="2" name="Object 1"/>
           <p:cNvGraphicFramePr>
             <a:graphicFrameLocks noChangeAspect="1"/>
           </p:cNvGraphicFramePr>
           <p:nvPr>
             <p:extLst>
               <p:ext uri="{D42A27DB-BD31-4B8C-83A1-F6EECF244321}">
-                <p14:modId xmlns:p14="http://schemas.microsoft.com/office/powerpoint/2010/main" val="1654848479"/>
+                <p14:modId xmlns:p14="http://schemas.microsoft.com/office/powerpoint/2010/main" val="1952771283"/>
               </p:ext>
             </p:extLst>
           </p:nvPr>
         </p:nvGraphicFramePr>
         <p:xfrm>
-          <a:off x="2417301" y="2209387"/>
-          <a:ext cx="4210027" cy="1302550"/>
+          <a:off x="2161890" y="2126277"/>
+          <a:ext cx="5178603" cy="2486755"/>
         </p:xfrm>
         <a:graphic>
           <a:graphicData uri="http://schemas.openxmlformats.org/presentationml/2006/ole">
             <mc:AlternateContent xmlns:mc="http://schemas.openxmlformats.org/markup-compatibility/2006">
               <mc:Choice xmlns:v="urn:schemas-microsoft-com:vml" Requires="v">
-                <p:oleObj spid="_x0000_s2054" name="Equation" r:id="rId3" imgW="2298700" imgH="711200" progId="Equation.DSMT4">
+                <p:oleObj spid="_x0000_s2063" name="Equation" r:id="rId3" imgW="2565400" imgH="1231900" progId="Equation.DSMT4">
                   <p:embed/>
                 </p:oleObj>
               </mc:Choice>
               <mc:Fallback>
-                <p:oleObj name="Equation" r:id="rId3" imgW="2298700" imgH="711200" progId="Equation.DSMT4">
+                <p:oleObj name="Equation" r:id="rId3" imgW="2565400" imgH="1231900" progId="Equation.DSMT4">
                   <p:embed/>
                   <p:pic>
                     <p:nvPicPr>
@@ -4887,8 +5055,8 @@
                     </p:blipFill>
                     <p:spPr>
                       <a:xfrm>
-                        <a:off x="2417301" y="2209387"/>
-                        <a:ext cx="4210027" cy="1302550"/>
+                        <a:off x="2161890" y="2126277"/>
+                        <a:ext cx="5178603" cy="2486755"/>
                       </a:xfrm>
                       <a:prstGeom prst="rect">
                         <a:avLst/>
@@ -4911,6 +5079,13 @@
   <p:clrMapOvr>
     <a:masterClrMapping/>
   </p:clrMapOvr>
+  <p:timing>
+    <p:tnLst>
+      <p:par>
+        <p:cTn xmlns:p14="http://schemas.microsoft.com/office/powerpoint/2010/main" id="1" dur="indefinite" restart="never" nodeType="tmRoot"/>
+      </p:par>
+    </p:tnLst>
+  </p:timing>
 </p:sld>
 </file>
 
@@ -4975,7 +5150,7 @@
         <p:spPr>
           <a:xfrm>
             <a:off x="313429" y="671170"/>
-            <a:ext cx="8602385" cy="5755423"/>
+            <a:ext cx="8602385" cy="6093977"/>
           </a:xfrm>
           <a:prstGeom prst="rect">
             <a:avLst/>
@@ -5083,7 +5258,7 @@
                 <a:latin typeface="Courier New"/>
                 <a:cs typeface="Courier New"/>
               </a:rPr>
-              <a:t>fitted_absorbance = [ first_order_function(t, popt[0], popt[1], popt[2]) for t in time ]</a:t>
+              <a:t>fitted_absorbance = first_order_function(time, popt[0], popt[1], popt[2])</a:t>
             </a:r>
           </a:p>
           <a:p>
@@ -5107,7 +5282,22 @@
                 <a:latin typeface="Courier New"/>
                 <a:cs typeface="Courier New"/>
               </a:rPr>
-              <a:t>plt.plot(time,fitted_absorbance,"k")</a:t>
+              <a:t>plt.plot(time,fitted_absorbance,"k"))</a:t>
+            </a:r>
+          </a:p>
+          <a:p>
+            <a:endParaRPr lang="en-US" dirty="0">
+              <a:latin typeface="Helvetica"/>
+              <a:cs typeface="Helvetica"/>
+            </a:endParaRPr>
+          </a:p>
+          <a:p>
+            <a:r>
+              <a:rPr lang="en-US" dirty="0">
+                <a:latin typeface="Helvetica"/>
+                <a:cs typeface="Helvetica"/>
+              </a:rPr>
+              <a:t>Note that we can apply functions to vectors!</a:t>
             </a:r>
           </a:p>
           <a:p>
@@ -5264,6 +5454,13 @@
   <p:clrMapOvr>
     <a:masterClrMapping/>
   </p:clrMapOvr>
+  <p:timing>
+    <p:tnLst>
+      <p:par>
+        <p:cTn xmlns:p14="http://schemas.microsoft.com/office/powerpoint/2010/main" id="1" dur="indefinite" restart="never" nodeType="tmRoot"/>
+      </p:par>
+    </p:tnLst>
+  </p:timing>
 </p:sld>
 </file>
 
@@ -5498,14 +5695,86 @@
         </p:blipFill>
         <p:spPr>
           <a:xfrm>
-            <a:off x="2044700" y="671170"/>
-            <a:ext cx="5054600" cy="4457700"/>
+            <a:off x="2289516" y="671170"/>
+            <a:ext cx="4582188" cy="4041075"/>
           </a:xfrm>
           <a:prstGeom prst="rect">
             <a:avLst/>
           </a:prstGeom>
         </p:spPr>
       </p:pic>
+      <p:sp>
+        <p:nvSpPr>
+          <p:cNvPr id="6" name="TextBox 5"/>
+          <p:cNvSpPr txBox="1"/>
+          <p:nvPr/>
+        </p:nvSpPr>
+        <p:spPr>
+          <a:xfrm>
+            <a:off x="994107" y="2937468"/>
+            <a:ext cx="3232542" cy="369332"/>
+          </a:xfrm>
+          <a:prstGeom prst="rect">
+            <a:avLst/>
+          </a:prstGeom>
+          <a:noFill/>
+        </p:spPr>
+        <p:txBody>
+          <a:bodyPr wrap="square" rtlCol="0">
+            <a:spAutoFit/>
+          </a:bodyPr>
+          <a:lstStyle/>
+          <a:p>
+            <a:r>
+              <a:rPr lang="en-US" dirty="0">
+                <a:latin typeface="Helvetica"/>
+                <a:cs typeface="Helvetica"/>
+              </a:rPr>
+              <a:t>absorbance</a:t>
+            </a:r>
+            <a:endParaRPr lang="en-US" dirty="0">
+              <a:latin typeface="Helvetica"/>
+              <a:cs typeface="Helvetica"/>
+            </a:endParaRPr>
+          </a:p>
+        </p:txBody>
+      </p:sp>
+      <p:sp>
+        <p:nvSpPr>
+          <p:cNvPr id="7" name="TextBox 6"/>
+          <p:cNvSpPr txBox="1"/>
+          <p:nvPr/>
+        </p:nvSpPr>
+        <p:spPr>
+          <a:xfrm>
+            <a:off x="4371691" y="4592327"/>
+            <a:ext cx="3232542" cy="369332"/>
+          </a:xfrm>
+          <a:prstGeom prst="rect">
+            <a:avLst/>
+          </a:prstGeom>
+          <a:noFill/>
+        </p:spPr>
+        <p:txBody>
+          <a:bodyPr wrap="square" rtlCol="0">
+            <a:spAutoFit/>
+          </a:bodyPr>
+          <a:lstStyle/>
+          <a:p>
+            <a:r>
+              <a:rPr lang="en-US" dirty="0">
+                <a:latin typeface="Helvetica"/>
+                <a:cs typeface="Helvetica"/>
+              </a:rPr>
+              <a:t>time</a:t>
+            </a:r>
+            <a:endParaRPr lang="en-US" dirty="0">
+              <a:latin typeface="Helvetica"/>
+              <a:cs typeface="Helvetica"/>
+            </a:endParaRPr>
+          </a:p>
+        </p:txBody>
+      </p:sp>
     </p:spTree>
     <p:extLst>
       <p:ext uri="{BB962C8B-B14F-4D97-AF65-F5344CB8AC3E}">
@@ -5516,6 +5785,13 @@
   <p:clrMapOvr>
     <a:masterClrMapping/>
   </p:clrMapOvr>
+  <p:timing>
+    <p:tnLst>
+      <p:par>
+        <p:cTn xmlns:p14="http://schemas.microsoft.com/office/powerpoint/2010/main" id="1" dur="indefinite" restart="never" nodeType="tmRoot"/>
+      </p:par>
+    </p:tnLst>
+  </p:timing>
 </p:sld>
 </file>
 
@@ -5598,7 +5874,7 @@
                 <a:latin typeface="Courier New"/>
                 <a:cs typeface="Courier New"/>
               </a:rPr>
-              <a:t>residual = fitted_absorbance - absorbance</a:t>
+              <a:t>residual = absorbance – fitted_absorbance</a:t>
             </a:r>
           </a:p>
           <a:p>
@@ -5787,7 +6063,7 @@
       </p:sp>
       <p:pic>
         <p:nvPicPr>
-          <p:cNvPr id="6" name="Picture 5"/>
+          <p:cNvPr id="8" name="Picture 7"/>
           <p:cNvPicPr>
             <a:picLocks noChangeAspect="1"/>
           </p:cNvPicPr>
@@ -5801,8 +6077,8 @@
         </p:blipFill>
         <p:spPr>
           <a:xfrm>
-            <a:off x="130933" y="2292091"/>
-            <a:ext cx="4506699" cy="2846336"/>
+            <a:off x="130933" y="5152082"/>
+            <a:ext cx="3124200" cy="254000"/>
           </a:xfrm>
           <a:prstGeom prst="rect">
             <a:avLst/>
@@ -5811,7 +6087,7 @@
       </p:pic>
       <p:pic>
         <p:nvPicPr>
-          <p:cNvPr id="7" name="Picture 6"/>
+          <p:cNvPr id="2" name="Picture 1"/>
           <p:cNvPicPr>
             <a:picLocks noChangeAspect="1"/>
           </p:cNvPicPr>
@@ -5825,8 +6101,8 @@
         </p:blipFill>
         <p:spPr>
           <a:xfrm>
-            <a:off x="4732410" y="2305746"/>
-            <a:ext cx="4298081" cy="2846336"/>
+            <a:off x="181426" y="2314104"/>
+            <a:ext cx="4276379" cy="2741269"/>
           </a:xfrm>
           <a:prstGeom prst="rect">
             <a:avLst/>
@@ -5835,7 +6111,7 @@
       </p:pic>
       <p:pic>
         <p:nvPicPr>
-          <p:cNvPr id="8" name="Picture 7"/>
+          <p:cNvPr id="3" name="Picture 2"/>
           <p:cNvPicPr>
             <a:picLocks noChangeAspect="1"/>
           </p:cNvPicPr>
@@ -5849,14 +6125,122 @@
         </p:blipFill>
         <p:spPr>
           <a:xfrm>
-            <a:off x="130933" y="5152082"/>
-            <a:ext cx="3124200" cy="254000"/>
+            <a:off x="4753426" y="2314105"/>
+            <a:ext cx="4144797" cy="2741268"/>
           </a:xfrm>
           <a:prstGeom prst="rect">
             <a:avLst/>
           </a:prstGeom>
         </p:spPr>
       </p:pic>
+      <p:sp>
+        <p:nvSpPr>
+          <p:cNvPr id="7" name="TextBox 6"/>
+          <p:cNvSpPr txBox="1"/>
+          <p:nvPr/>
+        </p:nvSpPr>
+        <p:spPr>
+          <a:xfrm>
+            <a:off x="1332367" y="2401978"/>
+            <a:ext cx="3232542" cy="276999"/>
+          </a:xfrm>
+          <a:prstGeom prst="rect">
+            <a:avLst/>
+          </a:prstGeom>
+          <a:noFill/>
+        </p:spPr>
+        <p:txBody>
+          <a:bodyPr wrap="square" rtlCol="0">
+            <a:spAutoFit/>
+          </a:bodyPr>
+          <a:lstStyle/>
+          <a:p>
+            <a:r>
+              <a:rPr lang="en-US" sz="1200" dirty="0">
+                <a:latin typeface="Helvetica"/>
+                <a:cs typeface="Helvetica"/>
+              </a:rPr>
+              <a:t>residual absorbance vs. time</a:t>
+            </a:r>
+            <a:endParaRPr lang="en-US" sz="1200" dirty="0">
+              <a:latin typeface="Helvetica"/>
+              <a:cs typeface="Helvetica"/>
+            </a:endParaRPr>
+          </a:p>
+        </p:txBody>
+      </p:sp>
+      <p:sp>
+        <p:nvSpPr>
+          <p:cNvPr id="9" name="TextBox 8"/>
+          <p:cNvSpPr txBox="1"/>
+          <p:nvPr/>
+        </p:nvSpPr>
+        <p:spPr>
+          <a:xfrm>
+            <a:off x="6065797" y="4978069"/>
+            <a:ext cx="2865318" cy="276999"/>
+          </a:xfrm>
+          <a:prstGeom prst="rect">
+            <a:avLst/>
+          </a:prstGeom>
+          <a:noFill/>
+        </p:spPr>
+        <p:txBody>
+          <a:bodyPr wrap="square" rtlCol="0">
+            <a:spAutoFit/>
+          </a:bodyPr>
+          <a:lstStyle/>
+          <a:p>
+            <a:r>
+              <a:rPr lang="en-US" sz="1200" dirty="0">
+                <a:latin typeface="Helvetica"/>
+                <a:cs typeface="Helvetica"/>
+              </a:rPr>
+              <a:t>residual absorbance</a:t>
+            </a:r>
+            <a:endParaRPr lang="en-US" sz="1200" dirty="0">
+              <a:latin typeface="Helvetica"/>
+              <a:cs typeface="Helvetica"/>
+            </a:endParaRPr>
+          </a:p>
+        </p:txBody>
+      </p:sp>
+      <p:sp>
+        <p:nvSpPr>
+          <p:cNvPr id="10" name="TextBox 9"/>
+          <p:cNvSpPr txBox="1"/>
+          <p:nvPr/>
+        </p:nvSpPr>
+        <p:spPr>
+          <a:xfrm>
+            <a:off x="4458618" y="3443118"/>
+            <a:ext cx="2865318" cy="276999"/>
+          </a:xfrm>
+          <a:prstGeom prst="rect">
+            <a:avLst/>
+          </a:prstGeom>
+          <a:noFill/>
+        </p:spPr>
+        <p:txBody>
+          <a:bodyPr wrap="square" rtlCol="0">
+            <a:spAutoFit/>
+          </a:bodyPr>
+          <a:lstStyle/>
+          <a:p>
+            <a:r>
+              <a:rPr lang="en-US" sz="1200" dirty="0">
+                <a:latin typeface="Helvetica"/>
+                <a:cs typeface="Helvetica"/>
+              </a:rPr>
+              <a:t>count</a:t>
+            </a:r>
+            <a:endParaRPr lang="en-US" sz="1200" dirty="0">
+              <a:latin typeface="Helvetica"/>
+              <a:cs typeface="Helvetica"/>
+            </a:endParaRPr>
+          </a:p>
+        </p:txBody>
+      </p:sp>
     </p:spTree>
     <p:extLst>
       <p:ext uri="{BB962C8B-B14F-4D97-AF65-F5344CB8AC3E}">
@@ -5867,6 +6251,13 @@
   <p:clrMapOvr>
     <a:masterClrMapping/>
   </p:clrMapOvr>
+  <p:timing>
+    <p:tnLst>
+      <p:par>
+        <p:cTn xmlns:p14="http://schemas.microsoft.com/office/powerpoint/2010/main" id="1" dur="indefinite" restart="never" nodeType="tmRoot"/>
+      </p:par>
+    </p:tnLst>
+  </p:timing>
 </p:sld>
 </file>
 
@@ -6089,6 +6480,78 @@
           </a:prstGeom>
         </p:spPr>
       </p:pic>
+      <p:sp>
+        <p:nvSpPr>
+          <p:cNvPr id="6" name="TextBox 5"/>
+          <p:cNvSpPr txBox="1"/>
+          <p:nvPr/>
+        </p:nvSpPr>
+        <p:spPr>
+          <a:xfrm>
+            <a:off x="871699" y="2477333"/>
+            <a:ext cx="3232542" cy="369332"/>
+          </a:xfrm>
+          <a:prstGeom prst="rect">
+            <a:avLst/>
+          </a:prstGeom>
+          <a:noFill/>
+        </p:spPr>
+        <p:txBody>
+          <a:bodyPr wrap="square" rtlCol="0">
+            <a:spAutoFit/>
+          </a:bodyPr>
+          <a:lstStyle/>
+          <a:p>
+            <a:r>
+              <a:rPr lang="en-US" dirty="0">
+                <a:latin typeface="Helvetica"/>
+                <a:cs typeface="Helvetica"/>
+              </a:rPr>
+              <a:t>absorbance</a:t>
+            </a:r>
+            <a:endParaRPr lang="en-US" dirty="0">
+              <a:latin typeface="Helvetica"/>
+              <a:cs typeface="Helvetica"/>
+            </a:endParaRPr>
+          </a:p>
+        </p:txBody>
+      </p:sp>
+      <p:sp>
+        <p:nvSpPr>
+          <p:cNvPr id="7" name="TextBox 6"/>
+          <p:cNvSpPr txBox="1"/>
+          <p:nvPr/>
+        </p:nvSpPr>
+        <p:spPr>
+          <a:xfrm>
+            <a:off x="6957487" y="4072357"/>
+            <a:ext cx="861104" cy="369332"/>
+          </a:xfrm>
+          <a:prstGeom prst="rect">
+            <a:avLst/>
+          </a:prstGeom>
+          <a:noFill/>
+        </p:spPr>
+        <p:txBody>
+          <a:bodyPr wrap="square" rtlCol="0">
+            <a:spAutoFit/>
+          </a:bodyPr>
+          <a:lstStyle/>
+          <a:p>
+            <a:r>
+              <a:rPr lang="en-US" dirty="0">
+                <a:latin typeface="Helvetica"/>
+                <a:cs typeface="Helvetica"/>
+              </a:rPr>
+              <a:t>time</a:t>
+            </a:r>
+            <a:endParaRPr lang="en-US" dirty="0">
+              <a:latin typeface="Helvetica"/>
+              <a:cs typeface="Helvetica"/>
+            </a:endParaRPr>
+          </a:p>
+        </p:txBody>
+      </p:sp>
     </p:spTree>
     <p:extLst>
       <p:ext uri="{BB962C8B-B14F-4D97-AF65-F5344CB8AC3E}">
@@ -6099,6 +6562,13 @@
   <p:clrMapOvr>
     <a:masterClrMapping/>
   </p:clrMapOvr>
+  <p:timing>
+    <p:tnLst>
+      <p:par>
+        <p:cTn xmlns:p14="http://schemas.microsoft.com/office/powerpoint/2010/main" id="1" dur="indefinite" restart="never" nodeType="tmRoot"/>
+      </p:par>
+    </p:tnLst>
+  </p:timing>
 </p:sld>
 </file>
 
@@ -6163,7 +6633,7 @@
         <p:spPr>
           <a:xfrm>
             <a:off x="313429" y="671170"/>
-            <a:ext cx="8602385" cy="4708982"/>
+            <a:ext cx="8602385" cy="4555094"/>
           </a:xfrm>
           <a:prstGeom prst="rect">
             <a:avLst/>
@@ -6185,6 +6655,21 @@
             </a:r>
           </a:p>
           <a:p>
+            <a:endParaRPr lang="en-US" dirty="0">
+              <a:latin typeface="Helvetica"/>
+              <a:cs typeface="Helvetica"/>
+            </a:endParaRPr>
+          </a:p>
+          <a:p>
+            <a:r>
+              <a:rPr lang="en-US" sz="1400" dirty="0">
+                <a:latin typeface="Courier New"/>
+                <a:cs typeface="Courier New"/>
+              </a:rPr>
+              <a:t>weights = [ (i/standard_deviation)**2 for i in absorbance ]</a:t>
+            </a:r>
+          </a:p>
+          <a:p>
             <a:endParaRPr lang="en-US" sz="1400" dirty="0">
               <a:latin typeface="Courier New"/>
               <a:cs typeface="Courier New"/>
@@ -6196,7 +6681,16 @@
                 <a:latin typeface="Courier New"/>
                 <a:cs typeface="Courier New"/>
               </a:rPr>
-              <a:t>weights = [ (i/standard_deviation)**2 for i in absorbance ]</a:t>
+              <a:t>popt, pcov = curve_fit(first_order_function, time, absorbance, sigma=weights)</a:t>
+            </a:r>
+          </a:p>
+          <a:p>
+            <a:r>
+              <a:rPr lang="en-US" sz="1400" dirty="0">
+                <a:latin typeface="Courier New"/>
+                <a:cs typeface="Courier New"/>
+              </a:rPr>
+              <a:t>errors = np.sqrt(np.diag(pcov))</a:t>
             </a:r>
           </a:p>
           <a:p>
@@ -6211,7 +6705,7 @@
                 <a:latin typeface="Courier New"/>
                 <a:cs typeface="Courier New"/>
               </a:rPr>
-              <a:t>popt, pcov = curve_fit(first_order_function, time, absorbance, sigma=weights)</a:t>
+              <a:t>print "pre_factor: %7.4f ± %6.4f" % (popt[0], errors[0])</a:t>
             </a:r>
           </a:p>
           <a:p>
@@ -6220,7 +6714,16 @@
                 <a:latin typeface="Courier New"/>
                 <a:cs typeface="Courier New"/>
               </a:rPr>
-              <a:t>errors = np.sqrt(np.diag(pcov))</a:t>
+              <a:t>print "rate_const: %7.4f ± %6.4f" % (popt[1], errors[1])</a:t>
+            </a:r>
+          </a:p>
+          <a:p>
+            <a:r>
+              <a:rPr lang="en-US" sz="1400" dirty="0">
+                <a:latin typeface="Courier New"/>
+                <a:cs typeface="Courier New"/>
+              </a:rPr>
+              <a:t>print "offset:     %7.4f ± %6.4f" % (popt[2], errors[2])</a:t>
             </a:r>
           </a:p>
           <a:p>
@@ -6235,25 +6738,7 @@
                 <a:latin typeface="Courier New"/>
                 <a:cs typeface="Courier New"/>
               </a:rPr>
-              <a:t>print "pre_factor: %7.4f ± %6.4f" % (popt[0], errors[0])</a:t>
-            </a:r>
-          </a:p>
-          <a:p>
-            <a:r>
-              <a:rPr lang="en-US" sz="1400" dirty="0">
-                <a:latin typeface="Courier New"/>
-                <a:cs typeface="Courier New"/>
-              </a:rPr>
-              <a:t>print "rate_const: %7.4f ± %6.4f" % (popt[1], errors[1])</a:t>
-            </a:r>
-          </a:p>
-          <a:p>
-            <a:r>
-              <a:rPr lang="en-US" sz="1400" dirty="0">
-                <a:latin typeface="Courier New"/>
-                <a:cs typeface="Courier New"/>
-              </a:rPr>
-              <a:t>print "offset:     %7.4f ± %6.4f" % (popt[2], errors[2])</a:t>
+              <a:t>fitted_absorbance2 = first_order_function(time, popt[0], popt[1], popt[2])</a:t>
             </a:r>
           </a:p>
           <a:p>
@@ -6268,37 +6753,26 @@
                 <a:latin typeface="Courier New"/>
                 <a:cs typeface="Courier New"/>
               </a:rPr>
-              <a:t>fitted_absorbance2 = [ first_order_function(t, popt[0], popt[1], popt[2]) for t in time ]</a:t>
-            </a:r>
-          </a:p>
-          <a:p>
-            <a:endParaRPr lang="en-US" sz="1400" dirty="0">
+              <a:t>plt.plot(time,absorbance,"k+")</a:t>
+            </a:r>
+          </a:p>
+          <a:p>
+            <a:r>
+              <a:rPr lang="en-US" sz="1400" dirty="0">
+                <a:latin typeface="Courier New"/>
+                <a:cs typeface="Courier New"/>
+              </a:rPr>
+              <a:t>plt.plot(time,fitted_absorbance2,"k")</a:t>
+            </a:r>
+            <a:endParaRPr lang="en-US" dirty="0">
               <a:latin typeface="Courier New"/>
               <a:cs typeface="Courier New"/>
             </a:endParaRPr>
           </a:p>
           <a:p>
-            <a:r>
-              <a:rPr lang="en-US" sz="1400" dirty="0">
-                <a:latin typeface="Courier New"/>
-                <a:cs typeface="Courier New"/>
-              </a:rPr>
-              <a:t>plt.plot(time,absorbance,"k+")</a:t>
-            </a:r>
-          </a:p>
-          <a:p>
-            <a:r>
-              <a:rPr lang="en-US" sz="1400" dirty="0">
-                <a:latin typeface="Courier New"/>
-                <a:cs typeface="Courier New"/>
-              </a:rPr>
-              <a:t>plt.plot(time,fitted_absorbance2,"k")</a:t>
-            </a:r>
-          </a:p>
-          <a:p>
-            <a:endParaRPr lang="en-US" dirty="0">
-              <a:latin typeface="Courier New"/>
-              <a:cs typeface="Courier New"/>
+            <a:endParaRPr lang="en-US" dirty="0">
+              <a:latin typeface="Helvetica"/>
+              <a:cs typeface="Helvetica"/>
             </a:endParaRPr>
           </a:p>
           <a:p>
@@ -6329,7 +6803,7 @@
                 <a:latin typeface="Courier New"/>
                 <a:cs typeface="Courier New"/>
               </a:rPr>
-              <a:t>fitted_absorbance_2</a:t>
+              <a:t>fitted_absorbance2</a:t>
             </a:r>
             <a:r>
               <a:rPr lang="en-US" dirty="0">
@@ -6351,6 +6825,13 @@
   <p:clrMapOvr>
     <a:masterClrMapping/>
   </p:clrMapOvr>
+  <p:timing>
+    <p:tnLst>
+      <p:par>
+        <p:cTn xmlns:p14="http://schemas.microsoft.com/office/powerpoint/2010/main" id="1" dur="indefinite" restart="never" nodeType="tmRoot"/>
+      </p:par>
+    </p:tnLst>
+  </p:timing>
 </p:sld>
 </file>
 
@@ -6494,7 +6975,7 @@
         </p:nvSpPr>
         <p:spPr>
           <a:xfrm>
-            <a:off x="8095665" y="1259862"/>
+            <a:off x="8065063" y="1259862"/>
             <a:ext cx="646443" cy="369332"/>
           </a:xfrm>
           <a:prstGeom prst="rect">
@@ -6562,6 +7043,78 @@
           </a:p>
         </p:txBody>
       </p:sp>
+      <p:sp>
+        <p:nvSpPr>
+          <p:cNvPr id="8" name="TextBox 7"/>
+          <p:cNvSpPr txBox="1"/>
+          <p:nvPr/>
+        </p:nvSpPr>
+        <p:spPr>
+          <a:xfrm>
+            <a:off x="15301" y="3655391"/>
+            <a:ext cx="3232542" cy="369332"/>
+          </a:xfrm>
+          <a:prstGeom prst="rect">
+            <a:avLst/>
+          </a:prstGeom>
+          <a:noFill/>
+        </p:spPr>
+        <p:txBody>
+          <a:bodyPr wrap="square" rtlCol="0">
+            <a:spAutoFit/>
+          </a:bodyPr>
+          <a:lstStyle/>
+          <a:p>
+            <a:r>
+              <a:rPr lang="en-US" dirty="0">
+                <a:latin typeface="Helvetica"/>
+                <a:cs typeface="Helvetica"/>
+              </a:rPr>
+              <a:t>abs.</a:t>
+            </a:r>
+            <a:endParaRPr lang="en-US" dirty="0">
+              <a:latin typeface="Helvetica"/>
+              <a:cs typeface="Helvetica"/>
+            </a:endParaRPr>
+          </a:p>
+        </p:txBody>
+      </p:sp>
+      <p:sp>
+        <p:nvSpPr>
+          <p:cNvPr id="9" name="TextBox 8"/>
+          <p:cNvSpPr txBox="1"/>
+          <p:nvPr/>
+        </p:nvSpPr>
+        <p:spPr>
+          <a:xfrm>
+            <a:off x="2811039" y="5444919"/>
+            <a:ext cx="861104" cy="369332"/>
+          </a:xfrm>
+          <a:prstGeom prst="rect">
+            <a:avLst/>
+          </a:prstGeom>
+          <a:noFill/>
+        </p:spPr>
+        <p:txBody>
+          <a:bodyPr wrap="square" rtlCol="0">
+            <a:spAutoFit/>
+          </a:bodyPr>
+          <a:lstStyle/>
+          <a:p>
+            <a:r>
+              <a:rPr lang="en-US" dirty="0">
+                <a:latin typeface="Helvetica"/>
+                <a:cs typeface="Helvetica"/>
+              </a:rPr>
+              <a:t>time</a:t>
+            </a:r>
+            <a:endParaRPr lang="en-US" dirty="0">
+              <a:latin typeface="Helvetica"/>
+              <a:cs typeface="Helvetica"/>
+            </a:endParaRPr>
+          </a:p>
+        </p:txBody>
+      </p:sp>
     </p:spTree>
     <p:extLst>
       <p:ext uri="{BB962C8B-B14F-4D97-AF65-F5344CB8AC3E}">
@@ -6572,6 +7125,13 @@
   <p:clrMapOvr>
     <a:masterClrMapping/>
   </p:clrMapOvr>
+  <p:timing>
+    <p:tnLst>
+      <p:par>
+        <p:cTn xmlns:p14="http://schemas.microsoft.com/office/powerpoint/2010/main" id="1" dur="indefinite" restart="never" nodeType="tmRoot"/>
+      </p:par>
+    </p:tnLst>
+  </p:timing>
 </p:sld>
 </file>
 
@@ -6723,10 +7283,6 @@
               </a:rPr>
               <a:t>, chi-square is defined as:</a:t>
             </a:r>
-            <a:endParaRPr lang="en-US" dirty="0">
-              <a:latin typeface="Helvetica"/>
-              <a:cs typeface="Helvetica"/>
-            </a:endParaRPr>
           </a:p>
           <a:p>
             <a:endParaRPr lang="en-US" dirty="0">
@@ -6846,7 +7402,7 @@
           <a:graphicData uri="http://schemas.openxmlformats.org/presentationml/2006/ole">
             <mc:AlternateContent xmlns:mc="http://schemas.openxmlformats.org/markup-compatibility/2006">
               <mc:Choice xmlns:v="urn:schemas-microsoft-com:vml" Requires="v">
-                <p:oleObj spid="_x0000_s9220" name="Equation" r:id="rId4" imgW="2006600" imgH="546100" progId="Equation.DSMT4">
+                <p:oleObj spid="_x0000_s9236" name="Equation" r:id="rId4" imgW="2006600" imgH="546100" progId="Equation.DSMT4">
                   <p:embed/>
                 </p:oleObj>
               </mc:Choice>
@@ -6903,7 +7459,7 @@
           <a:graphicData uri="http://schemas.openxmlformats.org/presentationml/2006/ole">
             <mc:AlternateContent xmlns:mc="http://schemas.openxmlformats.org/markup-compatibility/2006">
               <mc:Choice xmlns:v="urn:schemas-microsoft-com:vml" Requires="v">
-                <p:oleObj spid="_x0000_s9221" name="Equation" r:id="rId6" imgW="1104900" imgH="571500" progId="Equation.DSMT4">
+                <p:oleObj spid="_x0000_s9237" name="Equation" r:id="rId6" imgW="1104900" imgH="571500" progId="Equation.DSMT4">
                   <p:embed/>
                 </p:oleObj>
               </mc:Choice>
@@ -6948,6 +7504,13 @@
   <p:clrMapOvr>
     <a:masterClrMapping/>
   </p:clrMapOvr>
+  <p:timing>
+    <p:tnLst>
+      <p:par>
+        <p:cTn xmlns:p14="http://schemas.microsoft.com/office/powerpoint/2010/main" id="1" dur="indefinite" restart="never" nodeType="tmRoot"/>
+      </p:par>
+    </p:tnLst>
+  </p:timing>
 </p:sld>
 </file>
 
@@ -7186,6 +7749,74 @@
           </a:prstGeom>
         </p:spPr>
       </p:pic>
+      <p:sp>
+        <p:nvSpPr>
+          <p:cNvPr id="6" name="TextBox 5"/>
+          <p:cNvSpPr txBox="1"/>
+          <p:nvPr/>
+        </p:nvSpPr>
+        <p:spPr>
+          <a:xfrm>
+            <a:off x="998588" y="2600873"/>
+            <a:ext cx="3232542" cy="369332"/>
+          </a:xfrm>
+          <a:prstGeom prst="rect">
+            <a:avLst/>
+          </a:prstGeom>
+          <a:noFill/>
+        </p:spPr>
+        <p:txBody>
+          <a:bodyPr wrap="square" rtlCol="0">
+            <a:spAutoFit/>
+          </a:bodyPr>
+          <a:lstStyle/>
+          <a:p>
+            <a:r>
+              <a:rPr lang="en-US" dirty="0">
+                <a:latin typeface="Helvetica"/>
+                <a:cs typeface="Helvetica"/>
+              </a:rPr>
+              <a:t>absorbance</a:t>
+            </a:r>
+            <a:endParaRPr lang="en-US" dirty="0">
+              <a:latin typeface="Helvetica"/>
+              <a:cs typeface="Helvetica"/>
+            </a:endParaRPr>
+          </a:p>
+        </p:txBody>
+      </p:sp>
+      <p:sp>
+        <p:nvSpPr>
+          <p:cNvPr id="7" name="TextBox 6"/>
+          <p:cNvSpPr txBox="1"/>
+          <p:nvPr/>
+        </p:nvSpPr>
+        <p:spPr>
+          <a:xfrm>
+            <a:off x="4520616" y="4419742"/>
+            <a:ext cx="3232542" cy="369332"/>
+          </a:xfrm>
+          <a:prstGeom prst="rect">
+            <a:avLst/>
+          </a:prstGeom>
+          <a:noFill/>
+        </p:spPr>
+        <p:txBody>
+          <a:bodyPr wrap="square" rtlCol="0">
+            <a:spAutoFit/>
+          </a:bodyPr>
+          <a:lstStyle/>
+          <a:p>
+            <a:r>
+              <a:rPr lang="en-US" dirty="0">
+                <a:latin typeface="Helvetica"/>
+                <a:cs typeface="Helvetica"/>
+              </a:rPr>
+              <a:t>time</a:t>
+            </a:r>
+          </a:p>
+        </p:txBody>
+      </p:sp>
     </p:spTree>
     <p:extLst>
       <p:ext uri="{BB962C8B-B14F-4D97-AF65-F5344CB8AC3E}">
@@ -7196,6 +7827,13 @@
   <p:clrMapOvr>
     <a:masterClrMapping/>
   </p:clrMapOvr>
+  <p:timing>
+    <p:tnLst>
+      <p:par>
+        <p:cTn xmlns:p14="http://schemas.microsoft.com/office/powerpoint/2010/main" id="1" dur="indefinite" restart="never" nodeType="tmRoot"/>
+      </p:par>
+    </p:tnLst>
+  </p:timing>
 </p:sld>
 </file>
 
@@ -7470,6 +8108,13 @@
   <p:clrMapOvr>
     <a:masterClrMapping/>
   </p:clrMapOvr>
+  <p:timing>
+    <p:tnLst>
+      <p:par>
+        <p:cTn xmlns:p14="http://schemas.microsoft.com/office/powerpoint/2010/main" id="1" dur="indefinite" restart="never" nodeType="tmRoot"/>
+      </p:par>
+    </p:tnLst>
+  </p:timing>
 </p:sld>
 </file>
 
@@ -7556,7 +8201,7 @@
                 <a:latin typeface="Courier New"/>
                 <a:cs typeface="Courier New"/>
               </a:rPr>
-              <a:t>    chi_squared_value = 0.0</a:t>
+              <a:t>    chi_square_value = 0.0</a:t>
             </a:r>
           </a:p>
           <a:p>
@@ -7598,7 +8243,7 @@
                 <a:latin typeface="Courier New"/>
                 <a:cs typeface="Courier New"/>
               </a:rPr>
-              <a:t>        chi_squared_value += ((o-e) / standard_deviation)**2</a:t>
+              <a:t>        chi_square_value += ((o-e) / standard_deviation)**2</a:t>
             </a:r>
           </a:p>
           <a:p>
@@ -7616,7 +8261,7 @@
                 <a:latin typeface="Courier New"/>
                 <a:cs typeface="Courier New"/>
               </a:rPr>
-              <a:t>    return chi_squared_value</a:t>
+              <a:t>    return chi_square_value</a:t>
             </a:r>
           </a:p>
           <a:p>
@@ -7640,7 +8285,7 @@
                 <a:latin typeface="Courier New"/>
                 <a:cs typeface="Courier New"/>
               </a:rPr>
-              <a:t>print "chi_squared / dof = %.4f" % goodness_of_fit</a:t>
+              <a:t>print "chi_square / dof = %.4f" % goodness_of_fit</a:t>
             </a:r>
           </a:p>
           <a:p>
@@ -7697,7 +8342,7 @@
       </p:sp>
       <p:pic>
         <p:nvPicPr>
-          <p:cNvPr id="6" name="Picture 5"/>
+          <p:cNvPr id="2" name="Picture 1"/>
           <p:cNvPicPr>
             <a:picLocks noChangeAspect="1"/>
           </p:cNvPicPr>
@@ -7711,8 +8356,8 @@
         </p:blipFill>
         <p:spPr>
           <a:xfrm>
-            <a:off x="362911" y="5146518"/>
-            <a:ext cx="2882900" cy="279400"/>
+            <a:off x="378224" y="5284826"/>
+            <a:ext cx="2755900" cy="266700"/>
           </a:xfrm>
           <a:prstGeom prst="rect">
             <a:avLst/>
@@ -7729,6 +8374,13 @@
   <p:clrMapOvr>
     <a:masterClrMapping/>
   </p:clrMapOvr>
+  <p:timing>
+    <p:tnLst>
+      <p:par>
+        <p:cTn xmlns:p14="http://schemas.microsoft.com/office/powerpoint/2010/main" id="1" dur="indefinite" restart="never" nodeType="tmRoot"/>
+      </p:par>
+    </p:tnLst>
+  </p:timing>
 </p:sld>
 </file>
 
@@ -7776,6 +8428,21 @@
                 <a:latin typeface="Helvetica"/>
                 <a:cs typeface="Helvetica"/>
               </a:rPr>
+              <a:t>How good is the fit for other rate laws?</a:t>
+            </a:r>
+          </a:p>
+          <a:p>
+            <a:endParaRPr lang="en-US" dirty="0">
+              <a:latin typeface="Helvetica"/>
+              <a:cs typeface="Helvetica"/>
+            </a:endParaRPr>
+          </a:p>
+          <a:p>
+            <a:r>
+              <a:rPr lang="en-US" dirty="0">
+                <a:latin typeface="Helvetica"/>
+                <a:cs typeface="Helvetica"/>
+              </a:rPr>
               <a:t>For a zeroth-order process:</a:t>
             </a:r>
           </a:p>
@@ -7833,22 +8500,49 @@
                 <a:latin typeface="Helvetica"/>
                 <a:cs typeface="Helvetica"/>
               </a:rPr>
-              <a:t>In the last step, I collapsed the first and third terms into one constant.</a:t>
-            </a:r>
-          </a:p>
-          <a:p>
-            <a:endParaRPr lang="en-US" dirty="0">
-              <a:latin typeface="Helvetica"/>
-              <a:cs typeface="Helvetica"/>
-            </a:endParaRPr>
-          </a:p>
-          <a:p>
-            <a:r>
-              <a:rPr lang="en-US" dirty="0">
-                <a:latin typeface="Helvetica"/>
-                <a:cs typeface="Helvetica"/>
-              </a:rPr>
-              <a:t>Again, we can determine what the rate constant is without knowing what the extinction coefficient is.</a:t>
+              <a:t>This time, we cannot extract the rate cnstant because the term that is proportional to time depends on </a:t>
+            </a:r>
+            <a:r>
+              <a:rPr lang="en-US" i="1" dirty="0">
+                <a:latin typeface="Helvetica"/>
+                <a:cs typeface="Helvetica"/>
+              </a:rPr>
+              <a:t>ε’</a:t>
+            </a:r>
+            <a:r>
+              <a:rPr lang="en-US" dirty="0">
+                <a:latin typeface="Helvetica"/>
+                <a:cs typeface="Helvetica"/>
+              </a:rPr>
+              <a:t> and </a:t>
+            </a:r>
+            <a:r>
+              <a:rPr lang="en-US" i="1" dirty="0">
+                <a:latin typeface="Helvetica"/>
+                <a:cs typeface="Helvetica"/>
+              </a:rPr>
+              <a:t>k</a:t>
+            </a:r>
+            <a:r>
+              <a:rPr lang="en-US" dirty="0">
+                <a:latin typeface="Helvetica"/>
+                <a:cs typeface="Helvetica"/>
+              </a:rPr>
+              <a:t>, and we don’t know what </a:t>
+            </a:r>
+            <a:r>
+              <a:rPr lang="en-US" i="1" dirty="0">
+                <a:latin typeface="Helvetica"/>
+                <a:cs typeface="Helvetica"/>
+              </a:rPr>
+              <a:t>ε’</a:t>
+            </a:r>
+            <a:r>
+              <a:rPr lang="en-US" dirty="0">
+                <a:latin typeface="Helvetica"/>
+                <a:cs typeface="Helvetica"/>
+              </a:rPr>
+              <a:t> is.</a:t>
             </a:r>
           </a:p>
         </p:txBody>
@@ -7890,27 +8584,27 @@
       </p:sp>
       <p:graphicFrame>
         <p:nvGraphicFramePr>
-          <p:cNvPr id="2" name="Object 1"/>
+          <p:cNvPr id="3" name="Object 2"/>
           <p:cNvGraphicFramePr>
             <a:graphicFrameLocks noChangeAspect="1"/>
           </p:cNvGraphicFramePr>
           <p:nvPr>
             <p:extLst>
               <p:ext uri="{D42A27DB-BD31-4B8C-83A1-F6EECF244321}">
-                <p14:modId xmlns:p14="http://schemas.microsoft.com/office/powerpoint/2010/main" val="2452544002"/>
+                <p14:modId xmlns:p14="http://schemas.microsoft.com/office/powerpoint/2010/main" val="1468104992"/>
               </p:ext>
             </p:extLst>
           </p:nvPr>
         </p:nvGraphicFramePr>
         <p:xfrm>
-          <a:off x="2968519" y="1138206"/>
-          <a:ext cx="3227419" cy="1802903"/>
+          <a:off x="2860767" y="1709561"/>
+          <a:ext cx="3225887" cy="1802047"/>
         </p:xfrm>
         <a:graphic>
           <a:graphicData uri="http://schemas.openxmlformats.org/presentationml/2006/ole">
             <mc:AlternateContent xmlns:mc="http://schemas.openxmlformats.org/markup-compatibility/2006">
               <mc:Choice xmlns:v="urn:schemas-microsoft-com:vml" Requires="v">
-                <p:oleObj spid="_x0000_s12292" name="Equation" r:id="rId3" imgW="1841500" imgH="1028700" progId="Equation.DSMT4">
+                <p:oleObj spid="_x0000_s12302" name="Equation" r:id="rId3" imgW="1841500" imgH="1028700" progId="Equation.DSMT4">
                   <p:embed/>
                 </p:oleObj>
               </mc:Choice>
@@ -7931,8 +8625,8 @@
                     </p:blipFill>
                     <p:spPr>
                       <a:xfrm>
-                        <a:off x="2968519" y="1138206"/>
-                        <a:ext cx="3227419" cy="1802903"/>
+                        <a:off x="2860767" y="1709561"/>
+                        <a:ext cx="3225887" cy="1802047"/>
                       </a:xfrm>
                       <a:prstGeom prst="rect">
                         <a:avLst/>
@@ -7955,6 +8649,13 @@
   <p:clrMapOvr>
     <a:masterClrMapping/>
   </p:clrMapOvr>
+  <p:timing>
+    <p:tnLst>
+      <p:par>
+        <p:cTn xmlns:p14="http://schemas.microsoft.com/office/powerpoint/2010/main" id="1" dur="indefinite" restart="never" nodeType="tmRoot"/>
+      </p:par>
+    </p:tnLst>
+  </p:timing>
 </p:sld>
 </file>
 
@@ -7984,7 +8685,7 @@
         <p:spPr>
           <a:xfrm>
             <a:off x="313429" y="671170"/>
-            <a:ext cx="8602385" cy="5663090"/>
+            <a:ext cx="8602385" cy="5447646"/>
           </a:xfrm>
           <a:prstGeom prst="rect">
             <a:avLst/>
@@ -8002,7 +8703,7 @@
                 <a:latin typeface="Courier New"/>
                 <a:cs typeface="Courier New"/>
               </a:rPr>
-              <a:t>def zero_order_function(t, c_1, rate_constant):</a:t>
+              <a:t>def zero_order_function(t, c_1, c_2):</a:t>
             </a:r>
           </a:p>
           <a:p>
@@ -8011,7 +8712,7 @@
                 <a:latin typeface="Courier New"/>
                 <a:cs typeface="Courier New"/>
               </a:rPr>
-              <a:t>    return c_1 - rate_constant*t</a:t>
+              <a:t>    return c_1 - c_2*t</a:t>
             </a:r>
           </a:p>
           <a:p>
@@ -8044,7 +8745,7 @@
                 <a:latin typeface="Courier New"/>
                 <a:cs typeface="Courier New"/>
               </a:rPr>
-              <a:t>print "c_1:        %7.4f ± %6.4f" % (popt[0], errors[0])</a:t>
+              <a:t>print "c_1: %7.4f ± %6.4f" % (popt[0], errors[0])</a:t>
             </a:r>
           </a:p>
           <a:p>
@@ -8053,7 +8754,7 @@
                 <a:latin typeface="Courier New"/>
                 <a:cs typeface="Courier New"/>
               </a:rPr>
-              <a:t>print "rate_const: %7.4f ± %6.4f" % (popt[1], errors[1])</a:t>
+              <a:t>print "c_2: %7.4f ± %6.4f" % (popt[1], errors[1])</a:t>
             </a:r>
           </a:p>
           <a:p>
@@ -8068,7 +8769,7 @@
                 <a:latin typeface="Courier New"/>
                 <a:cs typeface="Courier New"/>
               </a:rPr>
-              <a:t>fitted_absorbance3 = [ zero_order_function(t, popt[0], popt[1]) for t in time ]</a:t>
+              <a:t>fitted_absorbance3 = zero_order_function(time, popt[0], popt[1])</a:t>
             </a:r>
           </a:p>
           <a:p>
@@ -8220,30 +8921,6 @@
           </a:p>
         </p:txBody>
       </p:sp>
-      <p:pic>
-        <p:nvPicPr>
-          <p:cNvPr id="2" name="Picture 1"/>
-          <p:cNvPicPr>
-            <a:picLocks noChangeAspect="1"/>
-          </p:cNvPicPr>
-          <p:nvPr/>
-        </p:nvPicPr>
-        <p:blipFill>
-          <a:blip r:embed="rId2"/>
-          <a:stretch>
-            <a:fillRect/>
-          </a:stretch>
-        </p:blipFill>
-        <p:spPr>
-          <a:xfrm>
-            <a:off x="4533702" y="2791488"/>
-            <a:ext cx="4514392" cy="3823413"/>
-          </a:xfrm>
-          <a:prstGeom prst="rect">
-            <a:avLst/>
-          </a:prstGeom>
-        </p:spPr>
-      </p:pic>
     </p:spTree>
     <p:extLst>
       <p:ext uri="{BB962C8B-B14F-4D97-AF65-F5344CB8AC3E}">
@@ -8254,6 +8931,13 @@
   <p:clrMapOvr>
     <a:masterClrMapping/>
   </p:clrMapOvr>
+  <p:timing>
+    <p:tnLst>
+      <p:par>
+        <p:cTn xmlns:p14="http://schemas.microsoft.com/office/powerpoint/2010/main" id="1" dur="indefinite" restart="never" nodeType="tmRoot"/>
+      </p:par>
+    </p:tnLst>
+  </p:timing>
 </p:sld>
 </file>
 
@@ -8283,7 +8967,7 @@
         <p:spPr>
           <a:xfrm>
             <a:off x="313429" y="671170"/>
-            <a:ext cx="8602385" cy="6032422"/>
+            <a:ext cx="8602385" cy="6155533"/>
           </a:xfrm>
           <a:prstGeom prst="rect">
             <a:avLst/>
@@ -8305,9 +8989,9 @@
             </a:r>
           </a:p>
           <a:p>
-            <a:endParaRPr lang="en-US" sz="1400" dirty="0">
-              <a:latin typeface="Courier New"/>
-              <a:cs typeface="Courier New"/>
+            <a:endParaRPr lang="en-US" dirty="0">
+              <a:latin typeface="Helvetica"/>
+              <a:cs typeface="Helvetica"/>
             </a:endParaRPr>
           </a:p>
           <a:p>
@@ -8352,8 +9036,12 @@
                 <a:latin typeface="Courier New"/>
                 <a:cs typeface="Courier New"/>
               </a:rPr>
-              <a:t>print "chi_squared / dof = %.4f" % goodness_of_fit</a:t>
-            </a:r>
+              <a:t>print "chi_square / dof = %.4f" % goodness_of_fit</a:t>
+            </a:r>
+            <a:endParaRPr lang="en-US" dirty="0">
+              <a:latin typeface="Helvetica"/>
+              <a:cs typeface="Helvetica"/>
+            </a:endParaRPr>
           </a:p>
           <a:p>
             <a:endParaRPr lang="en-US" dirty="0">
@@ -8487,7 +9175,7 @@
       </p:sp>
       <p:pic>
         <p:nvPicPr>
-          <p:cNvPr id="6" name="Picture 5"/>
+          <p:cNvPr id="2" name="Picture 1"/>
           <p:cNvPicPr>
             <a:picLocks noChangeAspect="1"/>
           </p:cNvPicPr>
@@ -8501,14 +9189,86 @@
         </p:blipFill>
         <p:spPr>
           <a:xfrm>
-            <a:off x="1979614" y="2658056"/>
-            <a:ext cx="5105400" cy="3632200"/>
+            <a:off x="2135411" y="2727285"/>
+            <a:ext cx="5054600" cy="3619500"/>
           </a:xfrm>
           <a:prstGeom prst="rect">
             <a:avLst/>
           </a:prstGeom>
         </p:spPr>
       </p:pic>
+      <p:sp>
+        <p:nvSpPr>
+          <p:cNvPr id="6" name="TextBox 5"/>
+          <p:cNvSpPr txBox="1"/>
+          <p:nvPr/>
+        </p:nvSpPr>
+        <p:spPr>
+          <a:xfrm>
+            <a:off x="979691" y="4397728"/>
+            <a:ext cx="3232542" cy="369332"/>
+          </a:xfrm>
+          <a:prstGeom prst="rect">
+            <a:avLst/>
+          </a:prstGeom>
+          <a:noFill/>
+        </p:spPr>
+        <p:txBody>
+          <a:bodyPr wrap="square" rtlCol="0">
+            <a:spAutoFit/>
+          </a:bodyPr>
+          <a:lstStyle/>
+          <a:p>
+            <a:r>
+              <a:rPr lang="en-US" dirty="0">
+                <a:latin typeface="Helvetica"/>
+                <a:cs typeface="Helvetica"/>
+              </a:rPr>
+              <a:t>absorbance</a:t>
+            </a:r>
+            <a:endParaRPr lang="en-US" dirty="0">
+              <a:latin typeface="Helvetica"/>
+              <a:cs typeface="Helvetica"/>
+            </a:endParaRPr>
+          </a:p>
+        </p:txBody>
+      </p:sp>
+      <p:sp>
+        <p:nvSpPr>
+          <p:cNvPr id="7" name="TextBox 6"/>
+          <p:cNvSpPr txBox="1"/>
+          <p:nvPr/>
+        </p:nvSpPr>
+        <p:spPr>
+          <a:xfrm>
+            <a:off x="7065479" y="5992752"/>
+            <a:ext cx="861104" cy="369332"/>
+          </a:xfrm>
+          <a:prstGeom prst="rect">
+            <a:avLst/>
+          </a:prstGeom>
+          <a:noFill/>
+        </p:spPr>
+        <p:txBody>
+          <a:bodyPr wrap="square" rtlCol="0">
+            <a:spAutoFit/>
+          </a:bodyPr>
+          <a:lstStyle/>
+          <a:p>
+            <a:r>
+              <a:rPr lang="en-US" dirty="0">
+                <a:latin typeface="Helvetica"/>
+                <a:cs typeface="Helvetica"/>
+              </a:rPr>
+              <a:t>time</a:t>
+            </a:r>
+            <a:endParaRPr lang="en-US" dirty="0">
+              <a:latin typeface="Helvetica"/>
+              <a:cs typeface="Helvetica"/>
+            </a:endParaRPr>
+          </a:p>
+        </p:txBody>
+      </p:sp>
     </p:spTree>
     <p:extLst>
       <p:ext uri="{BB962C8B-B14F-4D97-AF65-F5344CB8AC3E}">
@@ -8519,6 +9279,13 @@
   <p:clrMapOvr>
     <a:masterClrMapping/>
   </p:clrMapOvr>
+  <p:timing>
+    <p:tnLst>
+      <p:par>
+        <p:cTn xmlns:p14="http://schemas.microsoft.com/office/powerpoint/2010/main" id="1" dur="indefinite" restart="never" nodeType="tmRoot"/>
+      </p:par>
+    </p:tnLst>
+  </p:timing>
 </p:sld>
 </file>
 
@@ -8548,7 +9315,7 @@
         <p:spPr>
           <a:xfrm>
             <a:off x="313429" y="671170"/>
-            <a:ext cx="8602385" cy="4370427"/>
+            <a:ext cx="8602385" cy="5016757"/>
           </a:xfrm>
           <a:prstGeom prst="rect">
             <a:avLst/>
@@ -8566,7 +9333,172 @@
                 <a:latin typeface="Helvetica"/>
                 <a:cs typeface="Helvetica"/>
               </a:rPr>
-              <a:t>The fit is artifically bad because we fitted a lot of points at very high conversions:</a:t>
+              <a:t>The fit is artifically bad because we fitted a lot of points at very high conversions.  Repeating again with only the first 30 points:</a:t>
+            </a:r>
+          </a:p>
+          <a:p>
+            <a:endParaRPr lang="en-US" sz="1200" dirty="0">
+              <a:latin typeface="Courier New"/>
+              <a:cs typeface="Courier New"/>
+            </a:endParaRPr>
+          </a:p>
+          <a:p>
+            <a:r>
+              <a:rPr lang="en-US" sz="1200" dirty="0">
+                <a:latin typeface="Courier New"/>
+                <a:cs typeface="Courier New"/>
+              </a:rPr>
+              <a:t>popt, pcov = curve_fit(zero_order_function, time[:30], absorbance[:30])</a:t>
+            </a:r>
+          </a:p>
+          <a:p>
+            <a:r>
+              <a:rPr lang="en-US" sz="1200" dirty="0">
+                <a:latin typeface="Courier New"/>
+                <a:cs typeface="Courier New"/>
+              </a:rPr>
+              <a:t>errors = np.sqrt(np.diag(pcov))</a:t>
+            </a:r>
+          </a:p>
+          <a:p>
+            <a:r>
+              <a:rPr lang="en-US" sz="1200" dirty="0">
+                <a:latin typeface="Courier New"/>
+                <a:cs typeface="Courier New"/>
+              </a:rPr>
+              <a:t>print "c_1: %7.4f ± %6.4f" % (popt[0], errors[0])</a:t>
+            </a:r>
+          </a:p>
+          <a:p>
+            <a:r>
+              <a:rPr lang="en-US" sz="1200" dirty="0">
+                <a:latin typeface="Courier New"/>
+                <a:cs typeface="Courier New"/>
+              </a:rPr>
+              <a:t>print "c_2: %7.4f ± %6.4f" % (popt[1], errors[1])</a:t>
+            </a:r>
+          </a:p>
+          <a:p>
+            <a:endParaRPr lang="en-US" sz="1200" dirty="0">
+              <a:latin typeface="Courier New"/>
+              <a:cs typeface="Courier New"/>
+            </a:endParaRPr>
+          </a:p>
+          <a:p>
+            <a:r>
+              <a:rPr lang="en-US" sz="1200" dirty="0">
+                <a:latin typeface="Courier New"/>
+                <a:cs typeface="Courier New"/>
+              </a:rPr>
+              <a:t>fitted_absorbance3 = zero_order_function(time[:30], popt[0], popt[1])</a:t>
+            </a:r>
+          </a:p>
+          <a:p>
+            <a:endParaRPr lang="en-US" sz="1200" dirty="0">
+              <a:latin typeface="Courier New"/>
+              <a:cs typeface="Courier New"/>
+            </a:endParaRPr>
+          </a:p>
+          <a:p>
+            <a:r>
+              <a:rPr lang="en-US" sz="1200" dirty="0">
+                <a:latin typeface="Courier New"/>
+                <a:cs typeface="Courier New"/>
+              </a:rPr>
+              <a:t>goodness_of_fit =</a:t>
+            </a:r>
+          </a:p>
+          <a:p>
+            <a:r>
+              <a:rPr lang="en-US" sz="1200" dirty="0">
+                <a:latin typeface="Courier New"/>
+                <a:cs typeface="Courier New"/>
+              </a:rPr>
+              <a:t>chi_square(absorbance[:30],fitted_absorbance3,</a:t>
+            </a:r>
+          </a:p>
+          <a:p>
+            <a:r>
+              <a:rPr lang="en-US" sz="1200" dirty="0">
+                <a:latin typeface="Courier New"/>
+                <a:cs typeface="Courier New"/>
+              </a:rPr>
+              <a:t>standard_deviation) / dof</a:t>
+            </a:r>
+          </a:p>
+          <a:p>
+            <a:r>
+              <a:rPr lang="en-US" sz="1200" dirty="0">
+                <a:latin typeface="Courier New"/>
+                <a:cs typeface="Courier New"/>
+              </a:rPr>
+              <a:t>print "chi_square / dof = %.4f" % goodness_of_fit</a:t>
+            </a:r>
+          </a:p>
+          <a:p>
+            <a:endParaRPr lang="en-US" sz="1200" dirty="0">
+              <a:latin typeface="Courier New"/>
+              <a:cs typeface="Courier New"/>
+            </a:endParaRPr>
+          </a:p>
+          <a:p>
+            <a:r>
+              <a:rPr lang="en-US" sz="1200" dirty="0">
+                <a:latin typeface="Courier New"/>
+                <a:cs typeface="Courier New"/>
+              </a:rPr>
+              <a:t>plt.plot(time[:30],absorbance[:30],"k+")</a:t>
+            </a:r>
+          </a:p>
+          <a:p>
+            <a:r>
+              <a:rPr lang="en-US" sz="1200" dirty="0">
+                <a:latin typeface="Courier New"/>
+                <a:cs typeface="Courier New"/>
+              </a:rPr>
+              <a:t>plt.plot(time[:30],fitted_absorbance3[:30],"k")</a:t>
+            </a:r>
+          </a:p>
+          <a:p>
+            <a:endParaRPr lang="en-US" dirty="0">
+              <a:latin typeface="Courier New"/>
+              <a:cs typeface="Courier New"/>
+            </a:endParaRPr>
+          </a:p>
+          <a:p>
+            <a:r>
+              <a:rPr lang="en-US" dirty="0">
+                <a:latin typeface="Helvetica"/>
+                <a:cs typeface="Helvetica"/>
+              </a:rPr>
+              <a:t>The fit is much improved.  Recall that the</a:t>
+            </a:r>
+          </a:p>
+          <a:p>
+            <a:r>
+              <a:rPr lang="en-US" dirty="0">
+                <a:latin typeface="Helvetica"/>
+                <a:cs typeface="Helvetica"/>
+              </a:rPr>
+              <a:t>premise of initial rate kinetics is that all</a:t>
+            </a:r>
+          </a:p>
+          <a:p>
+            <a:r>
+              <a:rPr lang="en-US" dirty="0">
+                <a:latin typeface="Helvetica"/>
+                <a:cs typeface="Helvetica"/>
+              </a:rPr>
+              <a:t>kinetic data look zeroth-order at low</a:t>
+            </a:r>
+          </a:p>
+          <a:p>
+            <a:r>
+              <a:rPr lang="en-US" dirty="0">
+                <a:latin typeface="Helvetica"/>
+                <a:cs typeface="Helvetica"/>
+              </a:rPr>
+              <a:t>conversions.</a:t>
             </a:r>
           </a:p>
           <a:p>
@@ -8574,143 +9506,6 @@
               <a:latin typeface="Courier New"/>
               <a:cs typeface="Courier New"/>
             </a:endParaRPr>
-          </a:p>
-          <a:p>
-            <a:r>
-              <a:rPr lang="en-US" sz="1400" dirty="0">
-                <a:latin typeface="Courier New"/>
-                <a:cs typeface="Courier New"/>
-              </a:rPr>
-              <a:t>popt, pcov = curve_fit(zero_order_function, time[:30], absorbance[:30])</a:t>
-            </a:r>
-          </a:p>
-          <a:p>
-            <a:r>
-              <a:rPr lang="en-US" sz="1400" dirty="0">
-                <a:latin typeface="Courier New"/>
-                <a:cs typeface="Courier New"/>
-              </a:rPr>
-              <a:t>errors = np.sqrt(np.diag(pcov))</a:t>
-            </a:r>
-          </a:p>
-          <a:p>
-            <a:r>
-              <a:rPr lang="en-US" sz="1400" dirty="0">
-                <a:latin typeface="Courier New"/>
-                <a:cs typeface="Courier New"/>
-              </a:rPr>
-              <a:t>print "c_1:        %7.4f ± %6.4f" % (popt[0], errors[0])</a:t>
-            </a:r>
-          </a:p>
-          <a:p>
-            <a:r>
-              <a:rPr lang="en-US" sz="1400" dirty="0">
-                <a:latin typeface="Courier New"/>
-                <a:cs typeface="Courier New"/>
-              </a:rPr>
-              <a:t>print "rate_const: %7.4f ± %6.4f" % (popt[1], errors[1])</a:t>
-            </a:r>
-          </a:p>
-          <a:p>
-            <a:endParaRPr lang="en-US" sz="1400" dirty="0">
-              <a:latin typeface="Courier New"/>
-              <a:cs typeface="Courier New"/>
-            </a:endParaRPr>
-          </a:p>
-          <a:p>
-            <a:r>
-              <a:rPr lang="en-US" sz="1400" dirty="0">
-                <a:latin typeface="Courier New"/>
-                <a:cs typeface="Courier New"/>
-              </a:rPr>
-              <a:t>fitted_absorbance3 = [ zero_order_function(t, popt[0], popt[1]) for t in time[:30] ]</a:t>
-            </a:r>
-          </a:p>
-          <a:p>
-            <a:endParaRPr lang="en-US" sz="1400" dirty="0">
-              <a:latin typeface="Courier New"/>
-              <a:cs typeface="Courier New"/>
-            </a:endParaRPr>
-          </a:p>
-          <a:p>
-            <a:r>
-              <a:rPr lang="en-US" sz="1400" dirty="0">
-                <a:latin typeface="Courier New"/>
-                <a:cs typeface="Courier New"/>
-              </a:rPr>
-              <a:t>goodness_of_fit = chi_square(absorbance[:30],fitted_absorbance3,standard_deviation) / dof</a:t>
-            </a:r>
-          </a:p>
-          <a:p>
-            <a:r>
-              <a:rPr lang="en-US" sz="1400" dirty="0">
-                <a:latin typeface="Courier New"/>
-                <a:cs typeface="Courier New"/>
-              </a:rPr>
-              <a:t>print "chi_squared / dof = %.4f" % goodness_of_fit</a:t>
-            </a:r>
-          </a:p>
-          <a:p>
-            <a:endParaRPr lang="en-US" sz="1400" dirty="0">
-              <a:latin typeface="Courier New"/>
-              <a:cs typeface="Courier New"/>
-            </a:endParaRPr>
-          </a:p>
-          <a:p>
-            <a:r>
-              <a:rPr lang="en-US" sz="1400" dirty="0">
-                <a:latin typeface="Courier New"/>
-                <a:cs typeface="Courier New"/>
-              </a:rPr>
-              <a:t>plt.plot(time[:30],absorbance[:30],"k+")</a:t>
-            </a:r>
-          </a:p>
-          <a:p>
-            <a:r>
-              <a:rPr lang="en-US" sz="1400" dirty="0">
-                <a:latin typeface="Courier New"/>
-                <a:cs typeface="Courier New"/>
-              </a:rPr>
-              <a:t>plt.plot(time[:30],fitted_absorbance3[:30],"k")</a:t>
-            </a:r>
-          </a:p>
-          <a:p>
-            <a:endParaRPr lang="en-US" sz="1400" dirty="0">
-              <a:latin typeface="Courier New"/>
-              <a:cs typeface="Courier New"/>
-            </a:endParaRPr>
-          </a:p>
-          <a:p>
-            <a:r>
-              <a:rPr lang="en-US" dirty="0">
-                <a:latin typeface="Helvetica"/>
-                <a:cs typeface="Helvetica"/>
-              </a:rPr>
-              <a:t>This uses </a:t>
-            </a:r>
-            <a:r>
-              <a:rPr lang="en-US" dirty="0">
-                <a:latin typeface="Courier New"/>
-                <a:cs typeface="Courier New"/>
-              </a:rPr>
-              <a:t>[:30]</a:t>
-            </a:r>
-            <a:r>
-              <a:rPr lang="en-US" dirty="0">
-                <a:latin typeface="Helvetica"/>
-                <a:cs typeface="Helvetica"/>
-              </a:rPr>
-              <a:t> to deal with the first</a:t>
-            </a:r>
-          </a:p>
-          <a:p>
-            <a:r>
-              <a:rPr lang="en-US" dirty="0">
-                <a:latin typeface="Helvetica"/>
-                <a:cs typeface="Helvetica"/>
-              </a:rPr>
-              <a:t>thirty points only.</a:t>
-            </a:r>
           </a:p>
         </p:txBody>
       </p:sp>
@@ -8751,7 +9546,7 @@
       </p:sp>
       <p:pic>
         <p:nvPicPr>
-          <p:cNvPr id="7" name="Picture 6"/>
+          <p:cNvPr id="2" name="Picture 1"/>
           <p:cNvPicPr>
             <a:picLocks noChangeAspect="1"/>
           </p:cNvPicPr>
@@ -8765,38 +9560,50 @@
         </p:blipFill>
         <p:spPr>
           <a:xfrm>
-            <a:off x="1039174" y="5357373"/>
-            <a:ext cx="3162300" cy="749300"/>
+            <a:off x="5046728" y="2734129"/>
+            <a:ext cx="4097272" cy="3683299"/>
           </a:xfrm>
           <a:prstGeom prst="rect">
             <a:avLst/>
           </a:prstGeom>
         </p:spPr>
       </p:pic>
-      <p:pic>
-        <p:nvPicPr>
-          <p:cNvPr id="8" name="Picture 7"/>
-          <p:cNvPicPr>
-            <a:picLocks noChangeAspect="1"/>
-          </p:cNvPicPr>
+      <p:sp>
+        <p:nvSpPr>
+          <p:cNvPr id="6" name="TextBox 5"/>
+          <p:cNvSpPr txBox="1"/>
           <p:nvPr/>
-        </p:nvPicPr>
-        <p:blipFill>
-          <a:blip r:embed="rId3"/>
-          <a:stretch>
-            <a:fillRect/>
-          </a:stretch>
-        </p:blipFill>
-        <p:spPr>
-          <a:xfrm>
-            <a:off x="5432732" y="4272156"/>
-            <a:ext cx="3579315" cy="2414394"/>
+        </p:nvSpPr>
+        <p:spPr>
+          <a:xfrm>
+            <a:off x="7554519" y="3971828"/>
+            <a:ext cx="1345994" cy="369332"/>
           </a:xfrm>
           <a:prstGeom prst="rect">
             <a:avLst/>
           </a:prstGeom>
-        </p:spPr>
-      </p:pic>
+          <a:noFill/>
+        </p:spPr>
+        <p:txBody>
+          <a:bodyPr wrap="square" rtlCol="0">
+            <a:spAutoFit/>
+          </a:bodyPr>
+          <a:lstStyle/>
+          <a:p>
+            <a:r>
+              <a:rPr lang="en-US" dirty="0">
+                <a:latin typeface="Helvetica"/>
+                <a:cs typeface="Helvetica"/>
+              </a:rPr>
+              <a:t>[A] vs. time</a:t>
+            </a:r>
+            <a:endParaRPr lang="en-US" dirty="0">
+              <a:latin typeface="Helvetica"/>
+              <a:cs typeface="Helvetica"/>
+            </a:endParaRPr>
+          </a:p>
+        </p:txBody>
+      </p:sp>
     </p:spTree>
     <p:extLst>
       <p:ext uri="{BB962C8B-B14F-4D97-AF65-F5344CB8AC3E}">
@@ -8807,6 +9614,13 @@
   <p:clrMapOvr>
     <a:masterClrMapping/>
   </p:clrMapOvr>
+  <p:timing>
+    <p:tnLst>
+      <p:par>
+        <p:cTn xmlns:p14="http://schemas.microsoft.com/office/powerpoint/2010/main" id="1" dur="indefinite" restart="never" nodeType="tmRoot"/>
+      </p:par>
+    </p:tnLst>
+  </p:timing>
 </p:sld>
 </file>
 
@@ -9082,7 +9896,7 @@
           <a:graphicData uri="http://schemas.openxmlformats.org/presentationml/2006/ole">
             <mc:AlternateContent xmlns:mc="http://schemas.openxmlformats.org/markup-compatibility/2006">
               <mc:Choice xmlns:v="urn:schemas-microsoft-com:vml" Requires="v">
-                <p:oleObj spid="_x0000_s14340" name="Equation" r:id="rId3" imgW="1930400" imgH="3035300" progId="Equation.DSMT4">
+                <p:oleObj spid="_x0000_s14349" name="Equation" r:id="rId3" imgW="1930400" imgH="3035300" progId="Equation.DSMT4">
                   <p:embed/>
                 </p:oleObj>
               </mc:Choice>
@@ -9127,6 +9941,13 @@
   <p:clrMapOvr>
     <a:masterClrMapping/>
   </p:clrMapOvr>
+  <p:timing>
+    <p:tnLst>
+      <p:par>
+        <p:cTn xmlns:p14="http://schemas.microsoft.com/office/powerpoint/2010/main" id="1" dur="indefinite" restart="never" nodeType="tmRoot"/>
+      </p:par>
+    </p:tnLst>
+  </p:timing>
 </p:sld>
 </file>
 
@@ -9156,7 +9977,7 @@
         <p:spPr>
           <a:xfrm>
             <a:off x="313429" y="671170"/>
-            <a:ext cx="8602385" cy="5324536"/>
+            <a:ext cx="8602385" cy="5663090"/>
           </a:xfrm>
           <a:prstGeom prst="rect">
             <a:avLst/>
@@ -9249,7 +10070,7 @@
                 <a:latin typeface="Courier New"/>
                 <a:cs typeface="Courier New"/>
               </a:rPr>
-              <a:t>fitted_absorbance4 = [ second_order_function(t, popt[0], popt[1], popt[2]) for t in time ]</a:t>
+              <a:t>fitted_absorbance4 = second_order_function(time, popt[0], popt[1], popt[2])</a:t>
             </a:r>
           </a:p>
           <a:p>
@@ -9315,7 +10136,25 @@
                 <a:latin typeface="Helvetica"/>
                 <a:cs typeface="Helvetica"/>
               </a:rPr>
-              <a:t>are more senstitive to concentration.</a:t>
+              <a:t>are more sensitive to concentration.</a:t>
+            </a:r>
+          </a:p>
+          <a:p>
+            <a:r>
+              <a:rPr lang="en-US" dirty="0">
+                <a:latin typeface="Helvetica"/>
+                <a:cs typeface="Helvetica"/>
+              </a:rPr>
+              <a:t>The difference is most apparent at high</a:t>
+            </a:r>
+          </a:p>
+          <a:p>
+            <a:r>
+              <a:rPr lang="en-US" dirty="0">
+                <a:latin typeface="Helvetica"/>
+                <a:cs typeface="Helvetica"/>
+              </a:rPr>
+              <a:t>conversions.</a:t>
             </a:r>
           </a:p>
           <a:p>
@@ -9403,6 +10242,42 @@
           </a:prstGeom>
         </p:spPr>
       </p:pic>
+      <p:sp>
+        <p:nvSpPr>
+          <p:cNvPr id="7" name="TextBox 6"/>
+          <p:cNvSpPr txBox="1"/>
+          <p:nvPr/>
+        </p:nvSpPr>
+        <p:spPr>
+          <a:xfrm>
+            <a:off x="7585121" y="4170715"/>
+            <a:ext cx="1345994" cy="369332"/>
+          </a:xfrm>
+          <a:prstGeom prst="rect">
+            <a:avLst/>
+          </a:prstGeom>
+          <a:noFill/>
+        </p:spPr>
+        <p:txBody>
+          <a:bodyPr wrap="square" rtlCol="0">
+            <a:spAutoFit/>
+          </a:bodyPr>
+          <a:lstStyle/>
+          <a:p>
+            <a:r>
+              <a:rPr lang="en-US" dirty="0">
+                <a:latin typeface="Helvetica"/>
+                <a:cs typeface="Helvetica"/>
+              </a:rPr>
+              <a:t>[A] vs. time</a:t>
+            </a:r>
+            <a:endParaRPr lang="en-US" dirty="0">
+              <a:latin typeface="Helvetica"/>
+              <a:cs typeface="Helvetica"/>
+            </a:endParaRPr>
+          </a:p>
+        </p:txBody>
+      </p:sp>
     </p:spTree>
     <p:extLst>
       <p:ext uri="{BB962C8B-B14F-4D97-AF65-F5344CB8AC3E}">
@@ -9413,6 +10288,13 @@
   <p:clrMapOvr>
     <a:masterClrMapping/>
   </p:clrMapOvr>
+  <p:timing>
+    <p:tnLst>
+      <p:par>
+        <p:cTn xmlns:p14="http://schemas.microsoft.com/office/powerpoint/2010/main" id="1" dur="indefinite" restart="never" nodeType="tmRoot"/>
+      </p:par>
+    </p:tnLst>
+  </p:timing>
 </p:sld>
 </file>
 
@@ -9496,7 +10378,7 @@
                 <a:latin typeface="Courier New"/>
                 <a:cs typeface="Courier New"/>
               </a:rPr>
-              <a:t>print "chi_squared / dof = %.4f" % goodness_of_fit</a:t>
+              <a:t>print "chi_square / dof = %.4f" % goodness_of_fit</a:t>
             </a:r>
           </a:p>
           <a:p>
@@ -9637,7 +10519,7 @@
       </p:sp>
       <p:pic>
         <p:nvPicPr>
-          <p:cNvPr id="2" name="Picture 1"/>
+          <p:cNvPr id="3" name="Picture 2"/>
           <p:cNvPicPr>
             <a:picLocks noChangeAspect="1"/>
           </p:cNvPicPr>
@@ -9651,14 +10533,50 @@
         </p:blipFill>
         <p:spPr>
           <a:xfrm>
-            <a:off x="1919670" y="2181782"/>
-            <a:ext cx="5156200" cy="3619500"/>
+            <a:off x="2044700" y="2247840"/>
+            <a:ext cx="5054600" cy="3632200"/>
           </a:xfrm>
           <a:prstGeom prst="rect">
             <a:avLst/>
           </a:prstGeom>
         </p:spPr>
       </p:pic>
+      <p:sp>
+        <p:nvSpPr>
+          <p:cNvPr id="6" name="TextBox 5"/>
+          <p:cNvSpPr txBox="1"/>
+          <p:nvPr/>
+        </p:nvSpPr>
+        <p:spPr>
+          <a:xfrm>
+            <a:off x="3259006" y="2870265"/>
+            <a:ext cx="4524551" cy="369332"/>
+          </a:xfrm>
+          <a:prstGeom prst="rect">
+            <a:avLst/>
+          </a:prstGeom>
+          <a:noFill/>
+        </p:spPr>
+        <p:txBody>
+          <a:bodyPr wrap="square" rtlCol="0">
+            <a:spAutoFit/>
+          </a:bodyPr>
+          <a:lstStyle/>
+          <a:p>
+            <a:r>
+              <a:rPr lang="en-US" dirty="0">
+                <a:latin typeface="Helvetica"/>
+                <a:cs typeface="Helvetica"/>
+              </a:rPr>
+              <a:t>residual absorbance vs. time</a:t>
+            </a:r>
+            <a:endParaRPr lang="en-US" dirty="0">
+              <a:latin typeface="Helvetica"/>
+              <a:cs typeface="Helvetica"/>
+            </a:endParaRPr>
+          </a:p>
+        </p:txBody>
+      </p:sp>
     </p:spTree>
     <p:extLst>
       <p:ext uri="{BB962C8B-B14F-4D97-AF65-F5344CB8AC3E}">
@@ -9669,6 +10587,13 @@
   <p:clrMapOvr>
     <a:masterClrMapping/>
   </p:clrMapOvr>
+  <p:timing>
+    <p:tnLst>
+      <p:par>
+        <p:cTn xmlns:p14="http://schemas.microsoft.com/office/powerpoint/2010/main" id="1" dur="indefinite" restart="never" nodeType="tmRoot"/>
+      </p:par>
+    </p:tnLst>
+  </p:timing>
 </p:sld>
 </file>
 
@@ -9698,7 +10623,7 @@
         <p:spPr>
           <a:xfrm>
             <a:off x="313429" y="671170"/>
-            <a:ext cx="8602385" cy="4770536"/>
+            <a:ext cx="8602385" cy="4708981"/>
           </a:xfrm>
           <a:prstGeom prst="rect">
             <a:avLst/>
@@ -9830,8 +10755,12 @@
                 <a:latin typeface="Courier New"/>
                 <a:cs typeface="Courier New"/>
               </a:rPr>
-              <a:t>df = pd.read_excel("dataset1.xlsx")</a:t>
-            </a:r>
+              <a:t>df = pd.read_excel("dataset1.xlsx”)</a:t>
+            </a:r>
+            <a:endParaRPr lang="en-US" sz="1400" dirty="0">
+              <a:latin typeface="Helvetica"/>
+              <a:cs typeface="Helvetica"/>
+            </a:endParaRPr>
           </a:p>
           <a:p>
             <a:r>
@@ -9839,47 +10768,43 @@
                 <a:latin typeface="Courier New"/>
                 <a:cs typeface="Courier New"/>
               </a:rPr>
+              <a:t>time = df.time</a:t>
+            </a:r>
+          </a:p>
+          <a:p>
+            <a:r>
+              <a:rPr lang="en-US" sz="1400" dirty="0">
+                <a:latin typeface="Courier New"/>
+                <a:cs typeface="Courier New"/>
+              </a:rPr>
+              <a:t>absorbance = df.absorbance</a:t>
+            </a:r>
+          </a:p>
+          <a:p>
+            <a:r>
+              <a:rPr lang="en-US" sz="1400" dirty="0">
+                <a:latin typeface="Courier New"/>
+                <a:cs typeface="Courier New"/>
+              </a:rPr>
+              <a:t>print time[:5]</a:t>
+            </a:r>
+          </a:p>
+          <a:p>
+            <a:r>
+              <a:rPr lang="en-US" sz="1400" dirty="0">
+                <a:latin typeface="Courier New"/>
+                <a:cs typeface="Courier New"/>
+              </a:rPr>
+              <a:t>print absorbance[:5]</a:t>
+            </a:r>
+          </a:p>
+          <a:p>
+            <a:r>
+              <a:rPr lang="en-US" sz="1400" dirty="0">
+                <a:latin typeface="Courier New"/>
+                <a:cs typeface="Courier New"/>
+              </a:rPr>
               <a:t>df.head()</a:t>
-            </a:r>
-            <a:endParaRPr lang="en-US" sz="1400" dirty="0">
-              <a:latin typeface="Helvetica"/>
-              <a:cs typeface="Helvetica"/>
-            </a:endParaRPr>
-          </a:p>
-          <a:p>
-            <a:r>
-              <a:rPr lang="en-US" sz="1400" dirty="0">
-                <a:latin typeface="Courier New"/>
-                <a:cs typeface="Courier New"/>
-              </a:rPr>
-              <a:t>time = df["time"].tolist()</a:t>
-            </a:r>
-          </a:p>
-          <a:p>
-            <a:r>
-              <a:rPr lang="en-US" sz="1400" dirty="0">
-                <a:latin typeface="Courier New"/>
-                <a:cs typeface="Courier New"/>
-              </a:rPr>
-              <a:t>absorbance = df["absorbance"].tolist()</a:t>
-            </a:r>
-          </a:p>
-          <a:p>
-            <a:r>
-              <a:rPr lang="en-US" sz="1400" dirty="0">
-                <a:latin typeface="Courier New"/>
-                <a:cs typeface="Courier New"/>
-              </a:rPr>
-              <a:t>print time[:5]</a:t>
-            </a:r>
-          </a:p>
-          <a:p>
-            <a:r>
-              <a:rPr lang="en-US" sz="1400" dirty="0">
-                <a:latin typeface="Courier New"/>
-                <a:cs typeface="Courier New"/>
-              </a:rPr>
-              <a:t>print absorbance[:5]</a:t>
             </a:r>
           </a:p>
         </p:txBody>
@@ -9929,6 +10854,13 @@
   <p:clrMapOvr>
     <a:masterClrMapping/>
   </p:clrMapOvr>
+  <p:timing>
+    <p:tnLst>
+      <p:par>
+        <p:cTn xmlns:p14="http://schemas.microsoft.com/office/powerpoint/2010/main" id="1" dur="indefinite" restart="never" nodeType="tmRoot"/>
+      </p:par>
+    </p:tnLst>
+  </p:timing>
 </p:sld>
 </file>
 
@@ -10183,6 +11115,13 @@
   <p:clrMapOvr>
     <a:masterClrMapping/>
   </p:clrMapOvr>
+  <p:timing>
+    <p:tnLst>
+      <p:par>
+        <p:cTn xmlns:p14="http://schemas.microsoft.com/office/powerpoint/2010/main" id="1" dur="indefinite" restart="never" nodeType="tmRoot"/>
+      </p:par>
+    </p:tnLst>
+  </p:timing>
 </p:sld>
 </file>
 
@@ -10212,7 +11151,7 @@
         <p:spPr>
           <a:xfrm>
             <a:off x="313429" y="671170"/>
-            <a:ext cx="8602385" cy="6032422"/>
+            <a:ext cx="8602385" cy="4985981"/>
           </a:xfrm>
           <a:prstGeom prst="rect">
             <a:avLst/>
@@ -10245,7 +11184,7 @@
                 <a:latin typeface="Courier New"/>
                 <a:cs typeface="Courier New"/>
               </a:rPr>
-              <a:t>import numpy as np</a:t>
+              <a:t>df2 = pd.read_csv("dataset1.csv”)</a:t>
             </a:r>
           </a:p>
           <a:p>
@@ -10254,7 +11193,7 @@
                 <a:latin typeface="Courier New"/>
                 <a:cs typeface="Courier New"/>
               </a:rPr>
-              <a:t>data = np.genfromtxt("dataset1.csv", delimiter=",", skip_header=1)</a:t>
+              <a:t>time = df2.time</a:t>
             </a:r>
           </a:p>
           <a:p>
@@ -10263,7 +11202,7 @@
                 <a:latin typeface="Courier New"/>
                 <a:cs typeface="Courier New"/>
               </a:rPr>
-              <a:t>print data[:3]</a:t>
+              <a:t>absorbance = df2.absorbance</a:t>
             </a:r>
           </a:p>
           <a:p>
@@ -10272,7 +11211,7 @@
                 <a:latin typeface="Courier New"/>
                 <a:cs typeface="Courier New"/>
               </a:rPr>
-              <a:t>time=data[:,0]</a:t>
+              <a:t>print time[:5]</a:t>
             </a:r>
           </a:p>
           <a:p>
@@ -10281,7 +11220,7 @@
                 <a:latin typeface="Courier New"/>
                 <a:cs typeface="Courier New"/>
               </a:rPr>
-              <a:t>absorbance=data[:,1]</a:t>
+              <a:t>print absorbance[:5]</a:t>
             </a:r>
           </a:p>
           <a:p>
@@ -10290,31 +11229,7 @@
                 <a:latin typeface="Courier New"/>
                 <a:cs typeface="Courier New"/>
               </a:rPr>
-              <a:t>print time[:5]</a:t>
-            </a:r>
-          </a:p>
-          <a:p>
-            <a:r>
-              <a:rPr lang="en-US" sz="1400" dirty="0">
-                <a:latin typeface="Courier New"/>
-                <a:cs typeface="Courier New"/>
-              </a:rPr>
-              <a:t>print absorbance[:5]</a:t>
-            </a:r>
-          </a:p>
-          <a:p>
-            <a:endParaRPr lang="en-US" dirty="0">
-              <a:latin typeface="Helvetica"/>
-              <a:cs typeface="Helvetica"/>
-            </a:endParaRPr>
-          </a:p>
-          <a:p>
-            <a:r>
-              <a:rPr lang="en-US" dirty="0">
-                <a:latin typeface="Helvetica"/>
-                <a:cs typeface="Helvetica"/>
-              </a:rPr>
-              <a:t>This requires the numpy library.  List slicing (i.e., the notation in the square brackets) is needed to rearrange the data into vector form.</a:t>
+              <a:t>df2.head()</a:t>
             </a:r>
           </a:p>
           <a:p>
@@ -10398,7 +11313,7 @@
                 <a:latin typeface="Helvetica"/>
                 <a:cs typeface="Helvetica"/>
               </a:rPr>
-              <a:t>One can convert the absorbance data to concentration data before analysis using a standard curve.  For zeroth- and first-order reactions, this is not necessary.</a:t>
+              <a:t>One should convert the absorbance data to concentration data before analysis using a standard curve.  For a first-order reaction, one can extract the rate constant without doing this.</a:t>
             </a:r>
           </a:p>
         </p:txBody>
@@ -10448,6 +11363,13 @@
   <p:clrMapOvr>
     <a:masterClrMapping/>
   </p:clrMapOvr>
+  <p:timing>
+    <p:tnLst>
+      <p:par>
+        <p:cTn xmlns:p14="http://schemas.microsoft.com/office/powerpoint/2010/main" id="1" dur="indefinite" restart="never" nodeType="tmRoot"/>
+      </p:par>
+    </p:tnLst>
+  </p:timing>
 </p:sld>
 </file>
 
@@ -10477,7 +11399,7 @@
         <p:spPr>
           <a:xfrm>
             <a:off x="313429" y="671170"/>
-            <a:ext cx="8602385" cy="5170645"/>
+            <a:ext cx="8602385" cy="5539977"/>
           </a:xfrm>
           <a:prstGeom prst="rect">
             <a:avLst/>
@@ -10594,7 +11516,7 @@
                 <a:latin typeface="Courier New"/>
                 <a:cs typeface="Courier New"/>
               </a:rPr>
-              <a:t>data = np.genfromtxt("dataset1.csv", delimiter=",", skip_header=1)</a:t>
+              <a:t>df = pd.read_csv("dataset1.csv")</a:t>
             </a:r>
           </a:p>
           <a:p>
@@ -10603,7 +11525,7 @@
                 <a:latin typeface="Courier New"/>
                 <a:cs typeface="Courier New"/>
               </a:rPr>
-              <a:t>time=data[:,0]</a:t>
+              <a:t>time = df.time</a:t>
             </a:r>
           </a:p>
           <a:p>
@@ -10612,7 +11534,7 @@
                 <a:latin typeface="Courier New"/>
                 <a:cs typeface="Courier New"/>
               </a:rPr>
-              <a:t>absorbance=data[:,1]</a:t>
+              <a:t>absorbance = df.absorbance</a:t>
             </a:r>
           </a:p>
           <a:p>
@@ -10660,7 +11582,7 @@
                 <a:latin typeface="Courier New"/>
                 <a:cs typeface="Courier New"/>
               </a:rPr>
-              <a:t>fitted_absorbance = [ first_order_function(t, popt[0], popt[1], popt[2]) for t in time ]</a:t>
+              <a:t>fitted_absorbance = first_order_function(time, popt[0], popt[1], popt[2])</a:t>
             </a:r>
           </a:p>
           <a:p>
@@ -10669,7 +11591,7 @@
                 <a:latin typeface="Courier New"/>
                 <a:cs typeface="Courier New"/>
               </a:rPr>
-              <a:t>residual = fitted_absorbance - absorbance</a:t>
+              <a:t>residual = absorbance-fitted_absorbance</a:t>
             </a:r>
           </a:p>
           <a:p>
@@ -10688,6 +11610,21 @@
                 <a:cs typeface="Courier New"/>
               </a:rPr>
               <a:t>weights = [ (i/standard_deviation)**2 for i in absorbance ]</a:t>
+            </a:r>
+          </a:p>
+          <a:p>
+            <a:endParaRPr lang="en-US" sz="1200" b="1" dirty="0">
+              <a:latin typeface="Helvetica"/>
+              <a:cs typeface="Helvetica"/>
+            </a:endParaRPr>
+          </a:p>
+          <a:p>
+            <a:r>
+              <a:rPr lang="en-US" sz="1200" b="1" dirty="0">
+                <a:latin typeface="Helvetica"/>
+                <a:cs typeface="Helvetica"/>
+              </a:rPr>
+              <a:t>(continued on next page)</a:t>
             </a:r>
           </a:p>
         </p:txBody>
@@ -10766,7 +11703,7 @@
         <p:spPr>
           <a:xfrm>
             <a:off x="313429" y="671170"/>
-            <a:ext cx="8602385" cy="4524314"/>
+            <a:ext cx="8602385" cy="4431981"/>
           </a:xfrm>
           <a:prstGeom prst="rect">
             <a:avLst/>
@@ -10780,62 +11717,11 @@
           <a:lstStyle/>
           <a:p>
             <a:r>
-              <a:rPr lang="en-US" dirty="0">
+              <a:rPr lang="en-US" sz="1200" b="1" dirty="0">
                 <a:latin typeface="Helvetica"/>
                 <a:cs typeface="Helvetica"/>
               </a:rPr>
               <a:t>(continued)</a:t>
-            </a:r>
-          </a:p>
-          <a:p>
-            <a:endParaRPr lang="en-US" dirty="0">
-              <a:latin typeface="Helvetica"/>
-              <a:cs typeface="Helvetica"/>
-            </a:endParaRPr>
-          </a:p>
-          <a:p>
-            <a:r>
-              <a:rPr lang="en-US" sz="1200" dirty="0">
-                <a:latin typeface="Courier New"/>
-                <a:cs typeface="Courier New"/>
-              </a:rPr>
-              <a:t>popt, pcov = curve_fit(first_order_function, time, absorbance, sigma=weights)</a:t>
-            </a:r>
-          </a:p>
-          <a:p>
-            <a:r>
-              <a:rPr lang="en-US" sz="1200" dirty="0">
-                <a:latin typeface="Courier New"/>
-                <a:cs typeface="Courier New"/>
-              </a:rPr>
-              <a:t>errors = np.sqrt(np.diag(pcov))</a:t>
-            </a:r>
-          </a:p>
-          <a:p>
-            <a:r>
-              <a:rPr lang="en-US" sz="1200" dirty="0">
-                <a:latin typeface="Courier New"/>
-                <a:cs typeface="Courier New"/>
-              </a:rPr>
-              <a:t>print "pre_factor: %7.4f ± %6.4f" % (popt[0], errors[0])</a:t>
-            </a:r>
-          </a:p>
-          <a:p>
-            <a:r>
-              <a:rPr lang="en-US" sz="1200" dirty="0">
-                <a:latin typeface="Courier New"/>
-                <a:cs typeface="Courier New"/>
-              </a:rPr>
-              <a:t>print "rate_const: %7.4f ± %6.4f" % (popt[1], errors[1])</a:t>
-            </a:r>
-          </a:p>
-          <a:p>
-            <a:r>
-              <a:rPr lang="en-US" sz="1200" dirty="0">
-                <a:latin typeface="Courier New"/>
-                <a:cs typeface="Courier New"/>
-              </a:rPr>
-              <a:t>print "offset:     %7.4f ± %6.4f" % (popt[2], errors[2])</a:t>
             </a:r>
           </a:p>
           <a:p>
@@ -10850,7 +11736,43 @@
                 <a:latin typeface="Courier New"/>
                 <a:cs typeface="Courier New"/>
               </a:rPr>
-              <a:t>fitted_absorbance = [ first_order_function(t, popt[0], popt[1], popt[2]) for t in time ]</a:t>
+              <a:t>popt, pcov = curve_fit(first_order_function, time, absorbance, sigma=weights)</a:t>
+            </a:r>
+          </a:p>
+          <a:p>
+            <a:r>
+              <a:rPr lang="en-US" sz="1200" dirty="0">
+                <a:latin typeface="Courier New"/>
+                <a:cs typeface="Courier New"/>
+              </a:rPr>
+              <a:t>errors = np.sqrt(np.diag(pcov))</a:t>
+            </a:r>
+          </a:p>
+          <a:p>
+            <a:r>
+              <a:rPr lang="en-US" sz="1200" dirty="0">
+                <a:latin typeface="Courier New"/>
+                <a:cs typeface="Courier New"/>
+              </a:rPr>
+              <a:t>print "pre_factor: %7.4f ± %6.4f" % (popt[0], errors[0])</a:t>
+            </a:r>
+          </a:p>
+          <a:p>
+            <a:r>
+              <a:rPr lang="en-US" sz="1200" dirty="0">
+                <a:latin typeface="Courier New"/>
+                <a:cs typeface="Courier New"/>
+              </a:rPr>
+              <a:t>print "rate_const: %7.4f ± %6.4f" % (popt[1], errors[1])</a:t>
+            </a:r>
+          </a:p>
+          <a:p>
+            <a:r>
+              <a:rPr lang="en-US" sz="1200" dirty="0">
+                <a:latin typeface="Courier New"/>
+                <a:cs typeface="Courier New"/>
+              </a:rPr>
+              <a:t>print "offset:     %7.4f ± %6.4f" % (popt[2], errors[2])</a:t>
             </a:r>
           </a:p>
           <a:p>
@@ -10865,6 +11787,21 @@
                 <a:latin typeface="Courier New"/>
                 <a:cs typeface="Courier New"/>
               </a:rPr>
+              <a:t>fitted_absorbance = first_order_function(time, popt[0], popt[1], popt[2])</a:t>
+            </a:r>
+          </a:p>
+          <a:p>
+            <a:endParaRPr lang="en-US" sz="1200" dirty="0">
+              <a:latin typeface="Courier New"/>
+              <a:cs typeface="Courier New"/>
+            </a:endParaRPr>
+          </a:p>
+          <a:p>
+            <a:r>
+              <a:rPr lang="en-US" sz="1200" dirty="0">
+                <a:latin typeface="Courier New"/>
+                <a:cs typeface="Courier New"/>
+              </a:rPr>
               <a:t>dof = len(time)-3</a:t>
             </a:r>
           </a:p>
@@ -10946,7 +11883,7 @@
                 <a:latin typeface="Courier New"/>
                 <a:cs typeface="Courier New"/>
               </a:rPr>
-              <a:t>print "chi_squared / dof = %.4f" % goodness_of_fit</a:t>
+              <a:t>print "chi_square / dof = %.4f" % goodness_of_fit</a:t>
             </a:r>
           </a:p>
           <a:p>
@@ -11007,13 +11944,6 @@
               </a:rPr>
               <a:t>Sample Code</a:t>
             </a:r>
-            <a:endParaRPr lang="en-US" sz="2400" dirty="0">
-              <a:solidFill>
-                <a:srgbClr val="0000FF"/>
-              </a:solidFill>
-              <a:latin typeface="Helvetica"/>
-              <a:cs typeface="Helvetica"/>
-            </a:endParaRPr>
           </a:p>
         </p:txBody>
       </p:sp>
@@ -11033,8 +11963,8 @@
         </p:blipFill>
         <p:spPr>
           <a:xfrm>
-            <a:off x="5558562" y="4422492"/>
-            <a:ext cx="3357252" cy="2232308"/>
+            <a:off x="5299462" y="4250211"/>
+            <a:ext cx="3616352" cy="2404589"/>
           </a:xfrm>
           <a:prstGeom prst="rect">
             <a:avLst/>
@@ -11043,7 +11973,7 @@
       </p:pic>
       <p:pic>
         <p:nvPicPr>
-          <p:cNvPr id="3" name="Picture 2"/>
+          <p:cNvPr id="6" name="Picture 5"/>
           <p:cNvPicPr>
             <a:picLocks noChangeAspect="1"/>
           </p:cNvPicPr>
@@ -11057,14 +11987,50 @@
         </p:blipFill>
         <p:spPr>
           <a:xfrm>
-            <a:off x="313429" y="5429628"/>
-            <a:ext cx="3149600" cy="901700"/>
+            <a:off x="313429" y="5304491"/>
+            <a:ext cx="3124200" cy="939800"/>
           </a:xfrm>
           <a:prstGeom prst="rect">
             <a:avLst/>
           </a:prstGeom>
         </p:spPr>
       </p:pic>
+      <p:sp>
+        <p:nvSpPr>
+          <p:cNvPr id="7" name="TextBox 6"/>
+          <p:cNvSpPr txBox="1"/>
+          <p:nvPr/>
+        </p:nvSpPr>
+        <p:spPr>
+          <a:xfrm>
+            <a:off x="7427519" y="4400453"/>
+            <a:ext cx="1345994" cy="369332"/>
+          </a:xfrm>
+          <a:prstGeom prst="rect">
+            <a:avLst/>
+          </a:prstGeom>
+          <a:noFill/>
+        </p:spPr>
+        <p:txBody>
+          <a:bodyPr wrap="square" rtlCol="0">
+            <a:spAutoFit/>
+          </a:bodyPr>
+          <a:lstStyle/>
+          <a:p>
+            <a:r>
+              <a:rPr lang="en-US" dirty="0">
+                <a:latin typeface="Helvetica"/>
+                <a:cs typeface="Helvetica"/>
+              </a:rPr>
+              <a:t>[A] vs. time</a:t>
+            </a:r>
+            <a:endParaRPr lang="en-US" dirty="0">
+              <a:latin typeface="Helvetica"/>
+              <a:cs typeface="Helvetica"/>
+            </a:endParaRPr>
+          </a:p>
+        </p:txBody>
+      </p:sp>
     </p:spTree>
     <p:extLst>
       <p:ext uri="{BB962C8B-B14F-4D97-AF65-F5344CB8AC3E}">
@@ -11498,6 +12464,13 @@
   <p:clrMapOvr>
     <a:masterClrMapping/>
   </p:clrMapOvr>
+  <p:timing>
+    <p:tnLst>
+      <p:par>
+        <p:cTn xmlns:p14="http://schemas.microsoft.com/office/powerpoint/2010/main" id="1" dur="indefinite" restart="never" nodeType="tmRoot"/>
+      </p:par>
+    </p:tnLst>
+  </p:timing>
 </p:sld>
 </file>
 
@@ -11698,31 +12671,31 @@
                 <a:latin typeface="Helvetica"/>
                 <a:cs typeface="Helvetica"/>
               </a:rPr>
-              <a:t> stands for DataFrame, which is the pandas version of a spreadsheet.  To put the time and absorbances in lists:</a:t>
-            </a:r>
-          </a:p>
-          <a:p>
-            <a:endParaRPr lang="en-US" dirty="0">
-              <a:latin typeface="Helvetica"/>
-              <a:cs typeface="Helvetica"/>
-            </a:endParaRPr>
-          </a:p>
-          <a:p>
-            <a:r>
-              <a:rPr lang="en-US" dirty="0">
-                <a:latin typeface="Courier New"/>
-                <a:cs typeface="Courier New"/>
-              </a:rPr>
-              <a:t>time = df["time"].tolist()</a:t>
-            </a:r>
-          </a:p>
-          <a:p>
-            <a:r>
-              <a:rPr lang="en-US" dirty="0">
-                <a:latin typeface="Courier New"/>
-                <a:cs typeface="Courier New"/>
-              </a:rPr>
-              <a:t>absorbance = df["absorbance"].tolist()</a:t>
+              <a:t> stands for DataFrame, which is the pandas version of a spreadsheet.  For convenience:</a:t>
+            </a:r>
+          </a:p>
+          <a:p>
+            <a:endParaRPr lang="en-US" dirty="0">
+              <a:latin typeface="Helvetica"/>
+              <a:cs typeface="Helvetica"/>
+            </a:endParaRPr>
+          </a:p>
+          <a:p>
+            <a:r>
+              <a:rPr lang="en-US" dirty="0">
+                <a:latin typeface="Courier New"/>
+                <a:cs typeface="Courier New"/>
+              </a:rPr>
+              <a:t>time = df.time</a:t>
+            </a:r>
+          </a:p>
+          <a:p>
+            <a:r>
+              <a:rPr lang="en-US" dirty="0">
+                <a:latin typeface="Courier New"/>
+                <a:cs typeface="Courier New"/>
+              </a:rPr>
+              <a:t>absorbance = df.absorbance</a:t>
             </a:r>
           </a:p>
           <a:p>
@@ -11779,6 +12752,13 @@
   <p:clrMapOvr>
     <a:masterClrMapping/>
   </p:clrMapOvr>
+  <p:timing>
+    <p:tnLst>
+      <p:par>
+        <p:cTn xmlns:p14="http://schemas.microsoft.com/office/powerpoint/2010/main" id="1" dur="indefinite" restart="never" nodeType="tmRoot"/>
+      </p:par>
+    </p:tnLst>
+  </p:timing>
 </p:sld>
 </file>
 
@@ -11843,7 +12823,7 @@
         <p:spPr>
           <a:xfrm>
             <a:off x="313429" y="671170"/>
-            <a:ext cx="8602385" cy="5078314"/>
+            <a:ext cx="8602385" cy="5909311"/>
           </a:xfrm>
           <a:prstGeom prst="rect">
             <a:avLst/>
@@ -11898,28 +12878,40 @@
             </a:endParaRPr>
           </a:p>
           <a:p>
-            <a:r>
-              <a:rPr lang="en-US" dirty="0">
-                <a:latin typeface="Helvetica"/>
-                <a:cs typeface="Helvetica"/>
-              </a:rPr>
-              <a:t>In English:</a:t>
-            </a:r>
-          </a:p>
-          <a:p>
-            <a:endParaRPr lang="en-US" dirty="0">
-              <a:latin typeface="Helvetica"/>
-              <a:cs typeface="Helvetica"/>
-            </a:endParaRPr>
-          </a:p>
-          <a:p>
-            <a:r>
-              <a:rPr lang="en-US" dirty="0">
-                <a:latin typeface="Helvetica"/>
-                <a:cs typeface="Helvetica"/>
-              </a:rPr>
-              <a:t>Take the time/absorbance column and make it a list.  Print out the first five entries.</a:t>
-            </a:r>
+            <a:endParaRPr lang="en-US" dirty="0">
+              <a:latin typeface="Helvetica"/>
+              <a:cs typeface="Helvetica"/>
+            </a:endParaRPr>
+          </a:p>
+          <a:p>
+            <a:endParaRPr lang="en-US" dirty="0">
+              <a:latin typeface="Helvetica"/>
+              <a:cs typeface="Helvetica"/>
+            </a:endParaRPr>
+          </a:p>
+          <a:p>
+            <a:endParaRPr lang="en-US" dirty="0">
+              <a:latin typeface="Helvetica"/>
+              <a:cs typeface="Helvetica"/>
+            </a:endParaRPr>
+          </a:p>
+          <a:p>
+            <a:endParaRPr lang="en-US" dirty="0">
+              <a:latin typeface="Helvetica"/>
+              <a:cs typeface="Helvetica"/>
+            </a:endParaRPr>
+          </a:p>
+          <a:p>
+            <a:endParaRPr lang="en-US" dirty="0">
+              <a:latin typeface="Helvetica"/>
+              <a:cs typeface="Helvetica"/>
+            </a:endParaRPr>
+          </a:p>
+          <a:p>
+            <a:endParaRPr lang="en-US" dirty="0">
+              <a:latin typeface="Helvetica"/>
+              <a:cs typeface="Helvetica"/>
+            </a:endParaRPr>
           </a:p>
           <a:p>
             <a:endParaRPr lang="en-US" dirty="0">
@@ -11986,7 +12978,7 @@
       </p:sp>
       <p:pic>
         <p:nvPicPr>
-          <p:cNvPr id="3" name="Picture 2"/>
+          <p:cNvPr id="2" name="Picture 1"/>
           <p:cNvPicPr>
             <a:picLocks noChangeAspect="1"/>
           </p:cNvPicPr>
@@ -12000,8 +12992,8 @@
         </p:blipFill>
         <p:spPr>
           <a:xfrm>
-            <a:off x="1135057" y="671170"/>
-            <a:ext cx="7099300" cy="1803400"/>
+            <a:off x="2846870" y="671170"/>
+            <a:ext cx="3657600" cy="3797300"/>
           </a:xfrm>
           <a:prstGeom prst="rect">
             <a:avLst/>
@@ -12018,6 +13010,13 @@
   <p:clrMapOvr>
     <a:masterClrMapping/>
   </p:clrMapOvr>
+  <p:timing>
+    <p:tnLst>
+      <p:par>
+        <p:cTn xmlns:p14="http://schemas.microsoft.com/office/powerpoint/2010/main" id="1" dur="indefinite" restart="never" nodeType="tmRoot"/>
+      </p:par>
+    </p:tnLst>
+  </p:timing>
 </p:sld>
 </file>
 
@@ -12082,7 +13081,7 @@
         <p:spPr>
           <a:xfrm>
             <a:off x="313429" y="671170"/>
-            <a:ext cx="8602385" cy="5816978"/>
+            <a:ext cx="8602385" cy="5262980"/>
           </a:xfrm>
           <a:prstGeom prst="rect">
             <a:avLst/>
@@ -12100,7 +13099,7 @@
                 <a:latin typeface="Helvetica"/>
                 <a:cs typeface="Helvetica"/>
               </a:rPr>
-              <a:t>To load the CSV data, we can use numpy:</a:t>
+              <a:t>The same data can also be read from a CSV file:</a:t>
             </a:r>
           </a:p>
           <a:p>
@@ -12115,7 +13114,7 @@
                 <a:latin typeface="Courier New"/>
                 <a:cs typeface="Courier New"/>
               </a:rPr>
-              <a:t>data = np.genfromtxt("dataset1.csv", delimiter=",", skip_header=1)</a:t>
+              <a:t>df2 = pd.read_csv("dataset1.csv”)</a:t>
             </a:r>
           </a:p>
           <a:p>
@@ -12124,7 +13123,7 @@
                 <a:latin typeface="Courier New"/>
                 <a:cs typeface="Courier New"/>
               </a:rPr>
-              <a:t>print data[:3]</a:t>
+              <a:t>time = df2.time</a:t>
             </a:r>
           </a:p>
           <a:p>
@@ -12133,7 +13132,7 @@
                 <a:latin typeface="Courier New"/>
                 <a:cs typeface="Courier New"/>
               </a:rPr>
-              <a:t>time=data[:,0]</a:t>
+              <a:t>absorbance = df2.absorbance</a:t>
             </a:r>
           </a:p>
           <a:p>
@@ -12142,7 +13141,7 @@
                 <a:latin typeface="Courier New"/>
                 <a:cs typeface="Courier New"/>
               </a:rPr>
-              <a:t>absorbance=data[:,1]</a:t>
+              <a:t>print time[:5]</a:t>
             </a:r>
           </a:p>
           <a:p>
@@ -12151,7 +13150,7 @@
                 <a:latin typeface="Courier New"/>
                 <a:cs typeface="Courier New"/>
               </a:rPr>
-              <a:t>print time[:5]</a:t>
+              <a:t>print absorbance[:5]</a:t>
             </a:r>
           </a:p>
           <a:p>
@@ -12160,126 +13159,83 @@
                 <a:latin typeface="Courier New"/>
                 <a:cs typeface="Courier New"/>
               </a:rPr>
-              <a:t>print absorbance[:5]</a:t>
-            </a:r>
-          </a:p>
-          <a:p>
-            <a:endParaRPr lang="en-US" dirty="0">
-              <a:latin typeface="Helvetica"/>
-              <a:cs typeface="Helvetica"/>
-            </a:endParaRPr>
-          </a:p>
-          <a:p>
-            <a:r>
-              <a:rPr lang="en-US" dirty="0">
-                <a:latin typeface="Helvetica"/>
-                <a:cs typeface="Helvetica"/>
-              </a:rPr>
-              <a:t>The output is:</a:t>
-            </a:r>
-          </a:p>
-          <a:p>
-            <a:endParaRPr lang="en-US" dirty="0">
-              <a:latin typeface="Helvetica"/>
-              <a:cs typeface="Helvetica"/>
-            </a:endParaRPr>
-          </a:p>
-          <a:p>
-            <a:endParaRPr lang="en-US" dirty="0">
-              <a:latin typeface="Helvetica"/>
-              <a:cs typeface="Helvetica"/>
-            </a:endParaRPr>
-          </a:p>
-          <a:p>
-            <a:endParaRPr lang="en-US" dirty="0">
-              <a:latin typeface="Helvetica"/>
-              <a:cs typeface="Helvetica"/>
-            </a:endParaRPr>
-          </a:p>
-          <a:p>
-            <a:endParaRPr lang="en-US" dirty="0">
-              <a:latin typeface="Helvetica"/>
-              <a:cs typeface="Helvetica"/>
-            </a:endParaRPr>
-          </a:p>
-          <a:p>
-            <a:endParaRPr lang="en-US" dirty="0">
-              <a:latin typeface="Helvetica"/>
-              <a:cs typeface="Helvetica"/>
-            </a:endParaRPr>
-          </a:p>
-          <a:p>
-            <a:r>
-              <a:rPr lang="en-US" dirty="0">
-                <a:latin typeface="Helvetica"/>
-                <a:cs typeface="Helvetica"/>
-              </a:rPr>
-              <a:t>In English:</a:t>
-            </a:r>
-          </a:p>
-          <a:p>
-            <a:endParaRPr lang="en-US" dirty="0">
-              <a:latin typeface="Helvetica"/>
-              <a:cs typeface="Helvetica"/>
-            </a:endParaRPr>
-          </a:p>
-          <a:p>
-            <a:r>
-              <a:rPr lang="en-US" dirty="0">
-                <a:latin typeface="Helvetica"/>
-                <a:cs typeface="Helvetica"/>
-              </a:rPr>
-              <a:t>Load CSV data from </a:t>
-            </a:r>
-            <a:r>
-              <a:rPr lang="en-US" dirty="0">
-                <a:latin typeface="Courier New"/>
-                <a:cs typeface="Courier New"/>
-              </a:rPr>
-              <a:t>dataset1.csv</a:t>
-            </a:r>
-            <a:r>
-              <a:rPr lang="en-US" dirty="0">
-                <a:latin typeface="Helvetica"/>
-                <a:cs typeface="Helvetica"/>
-              </a:rPr>
-              <a:t>, where the columns are separated by commas, and ignore the first row.  Print out the first three entries.</a:t>
-            </a:r>
-          </a:p>
-          <a:p>
-            <a:endParaRPr lang="en-US" dirty="0">
-              <a:latin typeface="Helvetica"/>
-              <a:cs typeface="Helvetica"/>
-            </a:endParaRPr>
-          </a:p>
-          <a:p>
-            <a:r>
-              <a:rPr lang="en-US" dirty="0">
-                <a:latin typeface="Helvetica"/>
-                <a:cs typeface="Helvetica"/>
-              </a:rPr>
-              <a:t>As you can see, the data get loaded in “tuple” form, so we use </a:t>
-            </a:r>
-            <a:r>
-              <a:rPr lang="en-US" dirty="0">
-                <a:latin typeface="Courier New"/>
-                <a:cs typeface="Courier New"/>
-              </a:rPr>
-              <a:t>[:,0]</a:t>
-            </a:r>
-            <a:r>
-              <a:rPr lang="en-US" dirty="0">
-                <a:latin typeface="Helvetica"/>
-                <a:cs typeface="Helvetica"/>
-              </a:rPr>
-              <a:t> to transpose the data into column vectors.  We then print out the first five elements.</a:t>
+              <a:t>df2.head()</a:t>
+            </a:r>
+          </a:p>
+          <a:p>
+            <a:endParaRPr lang="en-US" dirty="0">
+              <a:latin typeface="Helvetica"/>
+              <a:cs typeface="Helvetica"/>
+            </a:endParaRPr>
+          </a:p>
+          <a:p>
+            <a:endParaRPr lang="en-US" dirty="0">
+              <a:latin typeface="Helvetica"/>
+              <a:cs typeface="Helvetica"/>
+            </a:endParaRPr>
+          </a:p>
+          <a:p>
+            <a:endParaRPr lang="en-US" dirty="0">
+              <a:latin typeface="Helvetica"/>
+              <a:cs typeface="Helvetica"/>
+            </a:endParaRPr>
+          </a:p>
+          <a:p>
+            <a:endParaRPr lang="en-US" dirty="0">
+              <a:latin typeface="Helvetica"/>
+              <a:cs typeface="Helvetica"/>
+            </a:endParaRPr>
+          </a:p>
+          <a:p>
+            <a:endParaRPr lang="en-US" dirty="0">
+              <a:latin typeface="Helvetica"/>
+              <a:cs typeface="Helvetica"/>
+            </a:endParaRPr>
+          </a:p>
+          <a:p>
+            <a:endParaRPr lang="en-US" dirty="0">
+              <a:latin typeface="Helvetica"/>
+              <a:cs typeface="Helvetica"/>
+            </a:endParaRPr>
+          </a:p>
+          <a:p>
+            <a:endParaRPr lang="en-US" dirty="0">
+              <a:latin typeface="Helvetica"/>
+              <a:cs typeface="Helvetica"/>
+            </a:endParaRPr>
+          </a:p>
+          <a:p>
+            <a:endParaRPr lang="en-US" dirty="0">
+              <a:latin typeface="Helvetica"/>
+              <a:cs typeface="Helvetica"/>
+            </a:endParaRPr>
+          </a:p>
+          <a:p>
+            <a:endParaRPr lang="en-US" dirty="0">
+              <a:latin typeface="Helvetica"/>
+              <a:cs typeface="Helvetica"/>
+            </a:endParaRPr>
+          </a:p>
+          <a:p>
+            <a:endParaRPr lang="en-US" dirty="0">
+              <a:latin typeface="Helvetica"/>
+              <a:cs typeface="Helvetica"/>
+            </a:endParaRPr>
+          </a:p>
+          <a:p>
+            <a:r>
+              <a:rPr lang="en-US" dirty="0">
+                <a:latin typeface="Helvetica"/>
+                <a:cs typeface="Helvetica"/>
+              </a:rPr>
+              <a:t>“df” stands for DataFrame, which is a pandas spreadsheet.  We will examine DataFrames in more detail during Exercise 3.</a:t>
             </a:r>
           </a:p>
         </p:txBody>
       </p:sp>
       <p:pic>
         <p:nvPicPr>
-          <p:cNvPr id="7" name="Picture 6"/>
+          <p:cNvPr id="2" name="Picture 1"/>
           <p:cNvPicPr>
             <a:picLocks noChangeAspect="1"/>
           </p:cNvPicPr>
@@ -12293,8 +13249,32 @@
         </p:blipFill>
         <p:spPr>
           <a:xfrm>
-            <a:off x="1429794" y="3176076"/>
-            <a:ext cx="6654800" cy="1193800"/>
+            <a:off x="4855472" y="1240275"/>
+            <a:ext cx="3644900" cy="2654300"/>
+          </a:xfrm>
+          <a:prstGeom prst="rect">
+            <a:avLst/>
+          </a:prstGeom>
+        </p:spPr>
+      </p:pic>
+      <p:pic>
+        <p:nvPicPr>
+          <p:cNvPr id="3" name="Picture 2"/>
+          <p:cNvPicPr>
+            <a:picLocks noChangeAspect="1"/>
+          </p:cNvPicPr>
+          <p:nvPr/>
+        </p:nvPicPr>
+        <p:blipFill>
+          <a:blip r:embed="rId3"/>
+          <a:stretch>
+            <a:fillRect/>
+          </a:stretch>
+        </p:blipFill>
+        <p:spPr>
+          <a:xfrm>
+            <a:off x="977214" y="2688075"/>
+            <a:ext cx="2019300" cy="2413000"/>
           </a:xfrm>
           <a:prstGeom prst="rect">
             <a:avLst/>
@@ -12311,6 +13291,13 @@
   <p:clrMapOvr>
     <a:masterClrMapping/>
   </p:clrMapOvr>
+  <p:timing>
+    <p:tnLst>
+      <p:par>
+        <p:cTn xmlns:p14="http://schemas.microsoft.com/office/powerpoint/2010/main" id="1" dur="indefinite" restart="never" nodeType="tmRoot"/>
+      </p:par>
+    </p:tnLst>
+  </p:timing>
 </p:sld>
 </file>
 
@@ -12375,7 +13362,7 @@
         <p:spPr>
           <a:xfrm>
             <a:off x="313429" y="671170"/>
-            <a:ext cx="8602385" cy="5078314"/>
+            <a:ext cx="8602385" cy="5355313"/>
           </a:xfrm>
           <a:prstGeom prst="rect">
             <a:avLst/>
@@ -12395,6 +13382,12 @@
               </a:rPr>
               <a:t>Let’s take a look at the data:</a:t>
             </a:r>
+          </a:p>
+          <a:p>
+            <a:endParaRPr lang="en-US" dirty="0">
+              <a:latin typeface="Helvetica"/>
+              <a:cs typeface="Helvetica"/>
+            </a:endParaRPr>
           </a:p>
           <a:p>
             <a:endParaRPr lang="en-US" dirty="0">
@@ -12519,7 +13512,7 @@
         </p:blipFill>
         <p:spPr>
           <a:xfrm>
-            <a:off x="751940" y="1109126"/>
+            <a:off x="1143414" y="1109126"/>
             <a:ext cx="7772400" cy="4203700"/>
           </a:xfrm>
           <a:prstGeom prst="rect">
@@ -12527,6 +13520,74 @@
           </a:prstGeom>
         </p:spPr>
       </p:pic>
+      <p:sp>
+        <p:nvSpPr>
+          <p:cNvPr id="6" name="TextBox 5"/>
+          <p:cNvSpPr txBox="1"/>
+          <p:nvPr/>
+        </p:nvSpPr>
+        <p:spPr>
+          <a:xfrm>
+            <a:off x="588847" y="3317770"/>
+            <a:ext cx="3232542" cy="369332"/>
+          </a:xfrm>
+          <a:prstGeom prst="rect">
+            <a:avLst/>
+          </a:prstGeom>
+          <a:noFill/>
+        </p:spPr>
+        <p:txBody>
+          <a:bodyPr wrap="square" rtlCol="0">
+            <a:spAutoFit/>
+          </a:bodyPr>
+          <a:lstStyle/>
+          <a:p>
+            <a:r>
+              <a:rPr lang="en-US" dirty="0">
+                <a:latin typeface="Helvetica"/>
+                <a:cs typeface="Helvetica"/>
+              </a:rPr>
+              <a:t>abs.</a:t>
+            </a:r>
+            <a:endParaRPr lang="en-US" dirty="0">
+              <a:latin typeface="Helvetica"/>
+              <a:cs typeface="Helvetica"/>
+            </a:endParaRPr>
+          </a:p>
+        </p:txBody>
+      </p:sp>
+      <p:sp>
+        <p:nvSpPr>
+          <p:cNvPr id="7" name="TextBox 6"/>
+          <p:cNvSpPr txBox="1"/>
+          <p:nvPr/>
+        </p:nvSpPr>
+        <p:spPr>
+          <a:xfrm>
+            <a:off x="3437649" y="5189356"/>
+            <a:ext cx="3232542" cy="369332"/>
+          </a:xfrm>
+          <a:prstGeom prst="rect">
+            <a:avLst/>
+          </a:prstGeom>
+          <a:noFill/>
+        </p:spPr>
+        <p:txBody>
+          <a:bodyPr wrap="square" rtlCol="0">
+            <a:spAutoFit/>
+          </a:bodyPr>
+          <a:lstStyle/>
+          <a:p>
+            <a:r>
+              <a:rPr lang="en-US" dirty="0">
+                <a:latin typeface="Helvetica"/>
+                <a:cs typeface="Helvetica"/>
+              </a:rPr>
+              <a:t>time</a:t>
+            </a:r>
+          </a:p>
+        </p:txBody>
+      </p:sp>
     </p:spTree>
     <p:extLst>
       <p:ext uri="{BB962C8B-B14F-4D97-AF65-F5344CB8AC3E}">
@@ -12537,6 +13598,13 @@
   <p:clrMapOvr>
     <a:masterClrMapping/>
   </p:clrMapOvr>
+  <p:timing>
+    <p:tnLst>
+      <p:par>
+        <p:cTn xmlns:p14="http://schemas.microsoft.com/office/powerpoint/2010/main" id="1" dur="indefinite" restart="never" nodeType="tmRoot"/>
+      </p:par>
+    </p:tnLst>
+  </p:timing>
 </p:sld>
 </file>
 
@@ -12663,6 +13731,13 @@
   <p:clrMapOvr>
     <a:masterClrMapping/>
   </p:clrMapOvr>
+  <p:timing>
+    <p:tnLst>
+      <p:par>
+        <p:cTn xmlns:p14="http://schemas.microsoft.com/office/powerpoint/2010/main" id="1" dur="indefinite" restart="never" nodeType="tmRoot"/>
+      </p:par>
+    </p:tnLst>
+  </p:timing>
 </p:sld>
 </file>
 

</xml_diff>